<commit_message>
Updating metis and webpage
</commit_message>
<xml_diff>
--- a/vignettes/vignetteFigs/00vignetteFigs.pptx
+++ b/vignettes/vignetteFigs/00vignetteFigs.pptx
@@ -5,7 +5,7 @@
     <p:sldMasterId id="2147483648" r:id="rId1"/>
   </p:sldMasterIdLst>
   <p:notesMasterIdLst>
-    <p:notesMasterId r:id="rId30"/>
+    <p:notesMasterId r:id="rId33"/>
   </p:notesMasterIdLst>
   <p:sldIdLst>
     <p:sldId id="260" r:id="rId2"/>
@@ -19,14 +19,14 @@
     <p:sldId id="265" r:id="rId10"/>
     <p:sldId id="268" r:id="rId11"/>
     <p:sldId id="266" r:id="rId12"/>
-    <p:sldId id="275" r:id="rId13"/>
-    <p:sldId id="277" r:id="rId14"/>
-    <p:sldId id="278" r:id="rId15"/>
-    <p:sldId id="276" r:id="rId16"/>
-    <p:sldId id="271" r:id="rId17"/>
-    <p:sldId id="272" r:id="rId18"/>
-    <p:sldId id="273" r:id="rId19"/>
-    <p:sldId id="274" r:id="rId20"/>
+    <p:sldId id="277" r:id="rId13"/>
+    <p:sldId id="278" r:id="rId14"/>
+    <p:sldId id="276" r:id="rId15"/>
+    <p:sldId id="271" r:id="rId16"/>
+    <p:sldId id="272" r:id="rId17"/>
+    <p:sldId id="273" r:id="rId18"/>
+    <p:sldId id="274" r:id="rId19"/>
+    <p:sldId id="294" r:id="rId20"/>
     <p:sldId id="279" r:id="rId21"/>
     <p:sldId id="280" r:id="rId22"/>
     <p:sldId id="281" r:id="rId23"/>
@@ -36,6 +36,9 @@
     <p:sldId id="286" r:id="rId27"/>
     <p:sldId id="283" r:id="rId28"/>
     <p:sldId id="284" r:id="rId29"/>
+    <p:sldId id="291" r:id="rId30"/>
+    <p:sldId id="292" r:id="rId31"/>
+    <p:sldId id="293" r:id="rId32"/>
   </p:sldIdLst>
   <p:sldSz cx="12192000" cy="6858000"/>
   <p:notesSz cx="6858000" cy="9144000"/>
@@ -224,7 +227,7 @@
           <a:p>
             <a:fld id="{921607FB-4AF3-41D9-93C1-AF2B65302971}" type="datetimeFigureOut">
               <a:rPr lang="en-US" smtClean="0"/>
-              <a:t>6/3/2020</a:t>
+              <a:t>6/5/2020</a:t>
             </a:fld>
             <a:endParaRPr lang="en-US"/>
           </a:p>
@@ -620,7 +623,7 @@
           <a:p>
             <a:fld id="{11D67388-0790-496E-9A12-37055489AF4F}" type="datetimeFigureOut">
               <a:rPr lang="en-US" smtClean="0"/>
-              <a:t>6/3/2020</a:t>
+              <a:t>6/5/2020</a:t>
             </a:fld>
             <a:endParaRPr lang="en-US"/>
           </a:p>
@@ -788,7 +791,7 @@
           <a:p>
             <a:fld id="{11D67388-0790-496E-9A12-37055489AF4F}" type="datetimeFigureOut">
               <a:rPr lang="en-US" smtClean="0"/>
-              <a:t>6/3/2020</a:t>
+              <a:t>6/5/2020</a:t>
             </a:fld>
             <a:endParaRPr lang="en-US"/>
           </a:p>
@@ -966,7 +969,7 @@
           <a:p>
             <a:fld id="{11D67388-0790-496E-9A12-37055489AF4F}" type="datetimeFigureOut">
               <a:rPr lang="en-US" smtClean="0"/>
-              <a:t>6/3/2020</a:t>
+              <a:t>6/5/2020</a:t>
             </a:fld>
             <a:endParaRPr lang="en-US"/>
           </a:p>
@@ -1134,7 +1137,7 @@
           <a:p>
             <a:fld id="{11D67388-0790-496E-9A12-37055489AF4F}" type="datetimeFigureOut">
               <a:rPr lang="en-US" smtClean="0"/>
-              <a:t>6/3/2020</a:t>
+              <a:t>6/5/2020</a:t>
             </a:fld>
             <a:endParaRPr lang="en-US"/>
           </a:p>
@@ -1379,7 +1382,7 @@
           <a:p>
             <a:fld id="{11D67388-0790-496E-9A12-37055489AF4F}" type="datetimeFigureOut">
               <a:rPr lang="en-US" smtClean="0"/>
-              <a:t>6/3/2020</a:t>
+              <a:t>6/5/2020</a:t>
             </a:fld>
             <a:endParaRPr lang="en-US"/>
           </a:p>
@@ -1608,7 +1611,7 @@
           <a:p>
             <a:fld id="{11D67388-0790-496E-9A12-37055489AF4F}" type="datetimeFigureOut">
               <a:rPr lang="en-US" smtClean="0"/>
-              <a:t>6/3/2020</a:t>
+              <a:t>6/5/2020</a:t>
             </a:fld>
             <a:endParaRPr lang="en-US"/>
           </a:p>
@@ -1972,7 +1975,7 @@
           <a:p>
             <a:fld id="{11D67388-0790-496E-9A12-37055489AF4F}" type="datetimeFigureOut">
               <a:rPr lang="en-US" smtClean="0"/>
-              <a:t>6/3/2020</a:t>
+              <a:t>6/5/2020</a:t>
             </a:fld>
             <a:endParaRPr lang="en-US"/>
           </a:p>
@@ -2089,7 +2092,7 @@
           <a:p>
             <a:fld id="{11D67388-0790-496E-9A12-37055489AF4F}" type="datetimeFigureOut">
               <a:rPr lang="en-US" smtClean="0"/>
-              <a:t>6/3/2020</a:t>
+              <a:t>6/5/2020</a:t>
             </a:fld>
             <a:endParaRPr lang="en-US"/>
           </a:p>
@@ -2184,7 +2187,7 @@
           <a:p>
             <a:fld id="{11D67388-0790-496E-9A12-37055489AF4F}" type="datetimeFigureOut">
               <a:rPr lang="en-US" smtClean="0"/>
-              <a:t>6/3/2020</a:t>
+              <a:t>6/5/2020</a:t>
             </a:fld>
             <a:endParaRPr lang="en-US"/>
           </a:p>
@@ -2459,7 +2462,7 @@
           <a:p>
             <a:fld id="{11D67388-0790-496E-9A12-37055489AF4F}" type="datetimeFigureOut">
               <a:rPr lang="en-US" smtClean="0"/>
-              <a:t>6/3/2020</a:t>
+              <a:t>6/5/2020</a:t>
             </a:fld>
             <a:endParaRPr lang="en-US"/>
           </a:p>
@@ -2711,7 +2714,7 @@
           <a:p>
             <a:fld id="{11D67388-0790-496E-9A12-37055489AF4F}" type="datetimeFigureOut">
               <a:rPr lang="en-US" smtClean="0"/>
-              <a:t>6/3/2020</a:t>
+              <a:t>6/5/2020</a:t>
             </a:fld>
             <a:endParaRPr lang="en-US"/>
           </a:p>
@@ -2922,7 +2925,7 @@
           <a:p>
             <a:fld id="{11D67388-0790-496E-9A12-37055489AF4F}" type="datetimeFigureOut">
               <a:rPr lang="en-US" smtClean="0"/>
-              <a:t>6/3/2020</a:t>
+              <a:t>6/5/2020</a:t>
             </a:fld>
             <a:endParaRPr lang="en-US"/>
           </a:p>
@@ -5200,1179 +5203,33 @@
           <a:chExt cx="0" cy="0"/>
         </a:xfrm>
       </p:grpSpPr>
-      <p:grpSp>
-        <p:nvGrpSpPr>
-          <p:cNvPr id="29" name="Group 28">
-            <a:extLst>
-              <a:ext uri="{FF2B5EF4-FFF2-40B4-BE49-F238E27FC236}">
-                <a16:creationId xmlns:a16="http://schemas.microsoft.com/office/drawing/2014/main" id="{C58F8E1E-8C63-4429-8479-25E00772295F}"/>
-              </a:ext>
-            </a:extLst>
-          </p:cNvPr>
-          <p:cNvGrpSpPr/>
-          <p:nvPr/>
-        </p:nvGrpSpPr>
-        <p:grpSpPr>
-          <a:xfrm>
-            <a:off x="5674206" y="658374"/>
-            <a:ext cx="2066223" cy="965296"/>
-            <a:chOff x="1811039" y="1300849"/>
-            <a:chExt cx="2066223" cy="965296"/>
-          </a:xfrm>
-        </p:grpSpPr>
-        <p:pic>
-          <p:nvPicPr>
-            <p:cNvPr id="30" name="Picture 2">
-              <a:extLst>
-                <a:ext uri="{FF2B5EF4-FFF2-40B4-BE49-F238E27FC236}">
-                  <a16:creationId xmlns:a16="http://schemas.microsoft.com/office/drawing/2014/main" id="{A06DD5BF-A739-44E1-90B2-9B05121801E3}"/>
-                </a:ext>
-              </a:extLst>
-            </p:cNvPr>
-            <p:cNvPicPr>
-              <a:picLocks noChangeAspect="1" noChangeArrowheads="1"/>
-            </p:cNvPicPr>
-            <p:nvPr/>
-          </p:nvPicPr>
-          <p:blipFill>
-            <a:blip r:embed="rId2" cstate="print">
-              <a:extLst>
-                <a:ext uri="{28A0092B-C50C-407E-A947-70E740481C1C}">
-                  <a14:useLocalDpi xmlns:a14="http://schemas.microsoft.com/office/drawing/2010/main" val="0"/>
-                </a:ext>
-              </a:extLst>
-            </a:blip>
-            <a:srcRect/>
-            <a:stretch>
-              <a:fillRect/>
-            </a:stretch>
-          </p:blipFill>
-          <p:spPr bwMode="auto">
-            <a:xfrm>
-              <a:off x="2512807" y="1603456"/>
-              <a:ext cx="662689" cy="662689"/>
-            </a:xfrm>
-            <a:prstGeom prst="rect">
-              <a:avLst/>
-            </a:prstGeom>
-            <a:noFill/>
-            <a:extLst>
-              <a:ext uri="{909E8E84-426E-40DD-AFC4-6F175D3DCCD1}">
-                <a14:hiddenFill xmlns:a14="http://schemas.microsoft.com/office/drawing/2010/main">
-                  <a:solidFill>
-                    <a:srgbClr val="FFFFFF"/>
-                  </a:solidFill>
-                </a14:hiddenFill>
-              </a:ext>
-            </a:extLst>
-          </p:spPr>
-        </p:pic>
-        <p:sp>
-          <p:nvSpPr>
-            <p:cNvPr id="31" name="TextBox 30">
-              <a:extLst>
-                <a:ext uri="{FF2B5EF4-FFF2-40B4-BE49-F238E27FC236}">
-                  <a16:creationId xmlns:a16="http://schemas.microsoft.com/office/drawing/2014/main" id="{281DA0B4-8762-42AF-820A-ECA752716621}"/>
-                </a:ext>
-              </a:extLst>
-            </p:cNvPr>
-            <p:cNvSpPr txBox="1"/>
-            <p:nvPr/>
-          </p:nvSpPr>
-          <p:spPr>
-            <a:xfrm>
-              <a:off x="1811039" y="1300849"/>
-              <a:ext cx="2066223" cy="369332"/>
-            </a:xfrm>
-            <a:prstGeom prst="rect">
-              <a:avLst/>
-            </a:prstGeom>
-            <a:noFill/>
-          </p:spPr>
-          <p:txBody>
-            <a:bodyPr wrap="square" rtlCol="0">
-              <a:spAutoFit/>
-            </a:bodyPr>
-            <a:lstStyle/>
-            <a:p>
-              <a:pPr algn="ctr"/>
-              <a:r>
-                <a:rPr lang="en-US"/>
-                <a:t>param</a:t>
-              </a:r>
-            </a:p>
-          </p:txBody>
-        </p:sp>
-      </p:grpSp>
-      <p:pic>
-        <p:nvPicPr>
-          <p:cNvPr id="10" name="Picture 9">
-            <a:extLst>
-              <a:ext uri="{FF2B5EF4-FFF2-40B4-BE49-F238E27FC236}">
-                <a16:creationId xmlns:a16="http://schemas.microsoft.com/office/drawing/2014/main" id="{0889A349-6C38-4A41-BCC2-850C0923563A}"/>
-              </a:ext>
-            </a:extLst>
-          </p:cNvPr>
-          <p:cNvPicPr>
-            <a:picLocks noChangeAspect="1"/>
-          </p:cNvPicPr>
-          <p:nvPr/>
-        </p:nvPicPr>
-        <p:blipFill>
-          <a:blip r:embed="rId3"/>
-          <a:stretch>
-            <a:fillRect/>
-          </a:stretch>
-        </p:blipFill>
-        <p:spPr>
-          <a:xfrm>
-            <a:off x="267384" y="3792360"/>
-            <a:ext cx="4022261" cy="1549315"/>
+      <p:sp>
+        <p:nvSpPr>
+          <p:cNvPr id="6" name="Rectangle 5">
+            <a:extLst>
+              <a:ext uri="{FF2B5EF4-FFF2-40B4-BE49-F238E27FC236}">
+                <a16:creationId xmlns:a16="http://schemas.microsoft.com/office/drawing/2014/main" id="{F2FAAE5D-6F5D-4276-A188-B0F75533DF8A}"/>
+              </a:ext>
+            </a:extLst>
+          </p:cNvPr>
+          <p:cNvSpPr/>
+          <p:nvPr/>
+        </p:nvSpPr>
+        <p:spPr>
+          <a:xfrm>
+            <a:off x="192163" y="579074"/>
+            <a:ext cx="11807674" cy="5168363"/>
           </a:xfrm>
           <a:prstGeom prst="rect">
             <a:avLst/>
           </a:prstGeom>
           <a:noFill/>
-          <a:ln w="3175">
+          <a:ln>
             <a:solidFill>
               <a:schemeClr val="bg1">
                 <a:lumMod val="65000"/>
               </a:schemeClr>
             </a:solidFill>
-          </a:ln>
-        </p:spPr>
-      </p:pic>
-      <p:grpSp>
-        <p:nvGrpSpPr>
-          <p:cNvPr id="23" name="Group 22">
-            <a:extLst>
-              <a:ext uri="{FF2B5EF4-FFF2-40B4-BE49-F238E27FC236}">
-                <a16:creationId xmlns:a16="http://schemas.microsoft.com/office/drawing/2014/main" id="{5D28B1FE-4871-463C-838B-5A81D7F868A4}"/>
-              </a:ext>
-            </a:extLst>
-          </p:cNvPr>
-          <p:cNvGrpSpPr/>
-          <p:nvPr/>
-        </p:nvGrpSpPr>
-        <p:grpSpPr>
-          <a:xfrm>
-            <a:off x="1370993" y="658374"/>
-            <a:ext cx="2066223" cy="965296"/>
-            <a:chOff x="1811039" y="1300849"/>
-            <a:chExt cx="2066223" cy="965296"/>
-          </a:xfrm>
-        </p:grpSpPr>
-        <p:pic>
-          <p:nvPicPr>
-            <p:cNvPr id="24" name="Picture 2">
-              <a:extLst>
-                <a:ext uri="{FF2B5EF4-FFF2-40B4-BE49-F238E27FC236}">
-                  <a16:creationId xmlns:a16="http://schemas.microsoft.com/office/drawing/2014/main" id="{B3FB0C7C-286F-4C0E-99A6-0A3BD6AF7480}"/>
-                </a:ext>
-              </a:extLst>
-            </p:cNvPr>
-            <p:cNvPicPr>
-              <a:picLocks noChangeAspect="1" noChangeArrowheads="1"/>
-            </p:cNvPicPr>
-            <p:nvPr/>
-          </p:nvPicPr>
-          <p:blipFill>
-            <a:blip r:embed="rId2" cstate="print">
-              <a:extLst>
-                <a:ext uri="{28A0092B-C50C-407E-A947-70E740481C1C}">
-                  <a14:useLocalDpi xmlns:a14="http://schemas.microsoft.com/office/drawing/2010/main" val="0"/>
-                </a:ext>
-              </a:extLst>
-            </a:blip>
-            <a:srcRect/>
-            <a:stretch>
-              <a:fillRect/>
-            </a:stretch>
-          </p:blipFill>
-          <p:spPr bwMode="auto">
-            <a:xfrm>
-              <a:off x="2512807" y="1603456"/>
-              <a:ext cx="662689" cy="662689"/>
-            </a:xfrm>
-            <a:prstGeom prst="rect">
-              <a:avLst/>
-            </a:prstGeom>
-            <a:noFill/>
-            <a:extLst>
-              <a:ext uri="{909E8E84-426E-40DD-AFC4-6F175D3DCCD1}">
-                <a14:hiddenFill xmlns:a14="http://schemas.microsoft.com/office/drawing/2010/main">
-                  <a:solidFill>
-                    <a:srgbClr val="FFFFFF"/>
-                  </a:solidFill>
-                </a14:hiddenFill>
-              </a:ext>
-            </a:extLst>
-          </p:spPr>
-        </p:pic>
-        <p:sp>
-          <p:nvSpPr>
-            <p:cNvPr id="25" name="TextBox 24">
-              <a:extLst>
-                <a:ext uri="{FF2B5EF4-FFF2-40B4-BE49-F238E27FC236}">
-                  <a16:creationId xmlns:a16="http://schemas.microsoft.com/office/drawing/2014/main" id="{331E44F7-35FC-4258-8CD5-84DE1BD6A02C}"/>
-                </a:ext>
-              </a:extLst>
-            </p:cNvPr>
-            <p:cNvSpPr txBox="1"/>
-            <p:nvPr/>
-          </p:nvSpPr>
-          <p:spPr>
-            <a:xfrm>
-              <a:off x="1811039" y="1300849"/>
-              <a:ext cx="2066223" cy="369332"/>
-            </a:xfrm>
-            <a:prstGeom prst="rect">
-              <a:avLst/>
-            </a:prstGeom>
-            <a:noFill/>
-          </p:spPr>
-          <p:txBody>
-            <a:bodyPr wrap="square" rtlCol="0">
-              <a:spAutoFit/>
-            </a:bodyPr>
-            <a:lstStyle/>
-            <a:p>
-              <a:pPr algn="ctr"/>
-              <a:r>
-                <a:rPr lang="en-US"/>
-                <a:t>outputs</a:t>
-              </a:r>
-            </a:p>
-          </p:txBody>
-        </p:sp>
-      </p:grpSp>
-      <p:grpSp>
-        <p:nvGrpSpPr>
-          <p:cNvPr id="26" name="Group 25">
-            <a:extLst>
-              <a:ext uri="{FF2B5EF4-FFF2-40B4-BE49-F238E27FC236}">
-                <a16:creationId xmlns:a16="http://schemas.microsoft.com/office/drawing/2014/main" id="{F8ABCB50-70E7-4DB2-B96A-6E8E77AF5983}"/>
-              </a:ext>
-            </a:extLst>
-          </p:cNvPr>
-          <p:cNvGrpSpPr/>
-          <p:nvPr/>
-        </p:nvGrpSpPr>
-        <p:grpSpPr>
-          <a:xfrm>
-            <a:off x="4605664" y="658374"/>
-            <a:ext cx="2066223" cy="965296"/>
-            <a:chOff x="1811039" y="1300849"/>
-            <a:chExt cx="2066223" cy="965296"/>
-          </a:xfrm>
-        </p:grpSpPr>
-        <p:pic>
-          <p:nvPicPr>
-            <p:cNvPr id="27" name="Picture 2">
-              <a:extLst>
-                <a:ext uri="{FF2B5EF4-FFF2-40B4-BE49-F238E27FC236}">
-                  <a16:creationId xmlns:a16="http://schemas.microsoft.com/office/drawing/2014/main" id="{5C62F180-7277-4194-9CED-7C99EAF3FCCE}"/>
-                </a:ext>
-              </a:extLst>
-            </p:cNvPr>
-            <p:cNvPicPr>
-              <a:picLocks noChangeAspect="1" noChangeArrowheads="1"/>
-            </p:cNvPicPr>
-            <p:nvPr/>
-          </p:nvPicPr>
-          <p:blipFill>
-            <a:blip r:embed="rId2" cstate="print">
-              <a:extLst>
-                <a:ext uri="{28A0092B-C50C-407E-A947-70E740481C1C}">
-                  <a14:useLocalDpi xmlns:a14="http://schemas.microsoft.com/office/drawing/2010/main" val="0"/>
-                </a:ext>
-              </a:extLst>
-            </a:blip>
-            <a:srcRect/>
-            <a:stretch>
-              <a:fillRect/>
-            </a:stretch>
-          </p:blipFill>
-          <p:spPr bwMode="auto">
-            <a:xfrm>
-              <a:off x="2512807" y="1603456"/>
-              <a:ext cx="662689" cy="662689"/>
-            </a:xfrm>
-            <a:prstGeom prst="rect">
-              <a:avLst/>
-            </a:prstGeom>
-            <a:noFill/>
-            <a:extLst>
-              <a:ext uri="{909E8E84-426E-40DD-AFC4-6F175D3DCCD1}">
-                <a14:hiddenFill xmlns:a14="http://schemas.microsoft.com/office/drawing/2010/main">
-                  <a:solidFill>
-                    <a:srgbClr val="FFFFFF"/>
-                  </a:solidFill>
-                </a14:hiddenFill>
-              </a:ext>
-            </a:extLst>
-          </p:spPr>
-        </p:pic>
-        <p:sp>
-          <p:nvSpPr>
-            <p:cNvPr id="28" name="TextBox 27">
-              <a:extLst>
-                <a:ext uri="{FF2B5EF4-FFF2-40B4-BE49-F238E27FC236}">
-                  <a16:creationId xmlns:a16="http://schemas.microsoft.com/office/drawing/2014/main" id="{D0B8A10D-8661-4473-8903-FD2834B7AF77}"/>
-                </a:ext>
-              </a:extLst>
-            </p:cNvPr>
-            <p:cNvSpPr txBox="1"/>
-            <p:nvPr/>
-          </p:nvSpPr>
-          <p:spPr>
-            <a:xfrm>
-              <a:off x="1811039" y="1300849"/>
-              <a:ext cx="2066223" cy="369332"/>
-            </a:xfrm>
-            <a:prstGeom prst="rect">
-              <a:avLst/>
-            </a:prstGeom>
-            <a:noFill/>
-          </p:spPr>
-          <p:txBody>
-            <a:bodyPr wrap="square" rtlCol="0">
-              <a:spAutoFit/>
-            </a:bodyPr>
-            <a:lstStyle/>
-            <a:p>
-              <a:pPr algn="ctr"/>
-              <a:r>
-                <a:rPr lang="en-US"/>
-                <a:t>US49</a:t>
-              </a:r>
-            </a:p>
-          </p:txBody>
-        </p:sp>
-      </p:grpSp>
-      <p:grpSp>
-        <p:nvGrpSpPr>
-          <p:cNvPr id="32" name="Group 31">
-            <a:extLst>
-              <a:ext uri="{FF2B5EF4-FFF2-40B4-BE49-F238E27FC236}">
-                <a16:creationId xmlns:a16="http://schemas.microsoft.com/office/drawing/2014/main" id="{22A529F0-6FD0-4F2D-8C46-A913DB80535F}"/>
-              </a:ext>
-            </a:extLst>
-          </p:cNvPr>
-          <p:cNvGrpSpPr/>
-          <p:nvPr/>
-        </p:nvGrpSpPr>
-        <p:grpSpPr>
-          <a:xfrm>
-            <a:off x="6709886" y="658374"/>
-            <a:ext cx="2066223" cy="965296"/>
-            <a:chOff x="1811039" y="1300849"/>
-            <a:chExt cx="2066223" cy="965296"/>
-          </a:xfrm>
-        </p:grpSpPr>
-        <p:pic>
-          <p:nvPicPr>
-            <p:cNvPr id="33" name="Picture 2">
-              <a:extLst>
-                <a:ext uri="{FF2B5EF4-FFF2-40B4-BE49-F238E27FC236}">
-                  <a16:creationId xmlns:a16="http://schemas.microsoft.com/office/drawing/2014/main" id="{16FA810E-9547-4D97-A0F0-B8529A670793}"/>
-                </a:ext>
-              </a:extLst>
-            </p:cNvPr>
-            <p:cNvPicPr>
-              <a:picLocks noChangeAspect="1" noChangeArrowheads="1"/>
-            </p:cNvPicPr>
-            <p:nvPr/>
-          </p:nvPicPr>
-          <p:blipFill>
-            <a:blip r:embed="rId2" cstate="print">
-              <a:extLst>
-                <a:ext uri="{28A0092B-C50C-407E-A947-70E740481C1C}">
-                  <a14:useLocalDpi xmlns:a14="http://schemas.microsoft.com/office/drawing/2010/main" val="0"/>
-                </a:ext>
-              </a:extLst>
-            </a:blip>
-            <a:srcRect/>
-            <a:stretch>
-              <a:fillRect/>
-            </a:stretch>
-          </p:blipFill>
-          <p:spPr bwMode="auto">
-            <a:xfrm>
-              <a:off x="2512807" y="1603456"/>
-              <a:ext cx="662689" cy="662689"/>
-            </a:xfrm>
-            <a:prstGeom prst="rect">
-              <a:avLst/>
-            </a:prstGeom>
-            <a:noFill/>
-            <a:extLst>
-              <a:ext uri="{909E8E84-426E-40DD-AFC4-6F175D3DCCD1}">
-                <a14:hiddenFill xmlns:a14="http://schemas.microsoft.com/office/drawing/2010/main">
-                  <a:solidFill>
-                    <a:srgbClr val="FFFFFF"/>
-                  </a:solidFill>
-                </a14:hiddenFill>
-              </a:ext>
-            </a:extLst>
-          </p:spPr>
-        </p:pic>
-        <p:sp>
-          <p:nvSpPr>
-            <p:cNvPr id="34" name="TextBox 33">
-              <a:extLst>
-                <a:ext uri="{FF2B5EF4-FFF2-40B4-BE49-F238E27FC236}">
-                  <a16:creationId xmlns:a16="http://schemas.microsoft.com/office/drawing/2014/main" id="{33DCE663-1CD4-410B-8DF4-2CBBC1C350E0}"/>
-                </a:ext>
-              </a:extLst>
-            </p:cNvPr>
-            <p:cNvSpPr txBox="1"/>
-            <p:nvPr/>
-          </p:nvSpPr>
-          <p:spPr>
-            <a:xfrm>
-              <a:off x="1811039" y="1300849"/>
-              <a:ext cx="2066223" cy="369332"/>
-            </a:xfrm>
-            <a:prstGeom prst="rect">
-              <a:avLst/>
-            </a:prstGeom>
-            <a:noFill/>
-          </p:spPr>
-          <p:txBody>
-            <a:bodyPr wrap="square" rtlCol="0">
-              <a:spAutoFit/>
-            </a:bodyPr>
-            <a:lstStyle/>
-            <a:p>
-              <a:pPr algn="ctr"/>
-              <a:r>
-                <a:rPr lang="en-US"/>
-                <a:t>scenario</a:t>
-              </a:r>
-            </a:p>
-          </p:txBody>
-        </p:sp>
-      </p:grpSp>
-      <p:cxnSp>
-        <p:nvCxnSpPr>
-          <p:cNvPr id="35" name="Straight Connector 34">
-            <a:extLst>
-              <a:ext uri="{FF2B5EF4-FFF2-40B4-BE49-F238E27FC236}">
-                <a16:creationId xmlns:a16="http://schemas.microsoft.com/office/drawing/2014/main" id="{DD1B5BD2-7017-4152-A7E4-CD00D8133DB3}"/>
-              </a:ext>
-            </a:extLst>
-          </p:cNvPr>
-          <p:cNvCxnSpPr>
-            <a:cxnSpLocks/>
-            <a:stCxn id="27" idx="3"/>
-            <a:endCxn id="30" idx="1"/>
-          </p:cNvCxnSpPr>
-          <p:nvPr/>
-        </p:nvCxnSpPr>
-        <p:spPr>
-          <a:xfrm>
-            <a:off x="5970121" y="1292326"/>
-            <a:ext cx="405853" cy="0"/>
-          </a:xfrm>
-          <a:prstGeom prst="line">
-            <a:avLst/>
-          </a:prstGeom>
-          <a:ln>
-            <a:tailEnd type="triangle" w="lg" len="lg"/>
-          </a:ln>
-        </p:spPr>
-        <p:style>
-          <a:lnRef idx="1">
-            <a:schemeClr val="dk1"/>
-          </a:lnRef>
-          <a:fillRef idx="0">
-            <a:schemeClr val="dk1"/>
-          </a:fillRef>
-          <a:effectRef idx="0">
-            <a:schemeClr val="dk1"/>
-          </a:effectRef>
-          <a:fontRef idx="minor">
-            <a:schemeClr val="tx1"/>
-          </a:fontRef>
-        </p:style>
-      </p:cxnSp>
-      <p:cxnSp>
-        <p:nvCxnSpPr>
-          <p:cNvPr id="36" name="Straight Connector 35">
-            <a:extLst>
-              <a:ext uri="{FF2B5EF4-FFF2-40B4-BE49-F238E27FC236}">
-                <a16:creationId xmlns:a16="http://schemas.microsoft.com/office/drawing/2014/main" id="{1490C1F6-7072-487F-A892-F7E1815611BA}"/>
-              </a:ext>
-            </a:extLst>
-          </p:cNvPr>
-          <p:cNvCxnSpPr>
-            <a:cxnSpLocks/>
-            <a:stCxn id="30" idx="3"/>
-            <a:endCxn id="33" idx="1"/>
-          </p:cNvCxnSpPr>
-          <p:nvPr/>
-        </p:nvCxnSpPr>
-        <p:spPr>
-          <a:xfrm>
-            <a:off x="7038663" y="1292326"/>
-            <a:ext cx="372991" cy="0"/>
-          </a:xfrm>
-          <a:prstGeom prst="line">
-            <a:avLst/>
-          </a:prstGeom>
-          <a:ln>
-            <a:tailEnd type="triangle" w="lg" len="lg"/>
-          </a:ln>
-        </p:spPr>
-        <p:style>
-          <a:lnRef idx="1">
-            <a:schemeClr val="dk1"/>
-          </a:lnRef>
-          <a:fillRef idx="0">
-            <a:schemeClr val="dk1"/>
-          </a:fillRef>
-          <a:effectRef idx="0">
-            <a:schemeClr val="dk1"/>
-          </a:effectRef>
-          <a:fontRef idx="minor">
-            <a:schemeClr val="tx1"/>
-          </a:fontRef>
-        </p:style>
-      </p:cxnSp>
-      <p:cxnSp>
-        <p:nvCxnSpPr>
-          <p:cNvPr id="37" name="Connector: Elbow 36">
-            <a:extLst>
-              <a:ext uri="{FF2B5EF4-FFF2-40B4-BE49-F238E27FC236}">
-                <a16:creationId xmlns:a16="http://schemas.microsoft.com/office/drawing/2014/main" id="{B33C2858-51DE-449E-A3F4-241A33285F8D}"/>
-              </a:ext>
-            </a:extLst>
-          </p:cNvPr>
-          <p:cNvCxnSpPr>
-            <a:cxnSpLocks/>
-            <a:stCxn id="33" idx="2"/>
-            <a:endCxn id="46" idx="0"/>
-          </p:cNvCxnSpPr>
-          <p:nvPr/>
-        </p:nvCxnSpPr>
-        <p:spPr>
-          <a:xfrm rot="5400000">
-            <a:off x="5765532" y="138599"/>
-            <a:ext cx="492396" cy="3462539"/>
-          </a:xfrm>
-          <a:prstGeom prst="bentConnector3">
-            <a:avLst>
-              <a:gd name="adj1" fmla="val 50000"/>
-            </a:avLst>
-          </a:prstGeom>
-          <a:ln>
-            <a:tailEnd type="triangle" w="lg" len="lg"/>
-          </a:ln>
-        </p:spPr>
-        <p:style>
-          <a:lnRef idx="1">
-            <a:schemeClr val="dk1"/>
-          </a:lnRef>
-          <a:fillRef idx="0">
-            <a:schemeClr val="dk1"/>
-          </a:fillRef>
-          <a:effectRef idx="0">
-            <a:schemeClr val="dk1"/>
-          </a:effectRef>
-          <a:fontRef idx="minor">
-            <a:schemeClr val="tx1"/>
-          </a:fontRef>
-        </p:style>
-      </p:cxnSp>
-      <p:grpSp>
-        <p:nvGrpSpPr>
-          <p:cNvPr id="38" name="Group 37">
-            <a:extLst>
-              <a:ext uri="{FF2B5EF4-FFF2-40B4-BE49-F238E27FC236}">
-                <a16:creationId xmlns:a16="http://schemas.microsoft.com/office/drawing/2014/main" id="{F7BDF307-857D-411B-837F-F41F82978974}"/>
-              </a:ext>
-            </a:extLst>
-          </p:cNvPr>
-          <p:cNvGrpSpPr/>
-          <p:nvPr/>
-        </p:nvGrpSpPr>
-        <p:grpSpPr>
-          <a:xfrm>
-            <a:off x="2525590" y="658374"/>
-            <a:ext cx="2066223" cy="965296"/>
-            <a:chOff x="1811039" y="1300849"/>
-            <a:chExt cx="2066223" cy="965296"/>
-          </a:xfrm>
-        </p:grpSpPr>
-        <p:pic>
-          <p:nvPicPr>
-            <p:cNvPr id="39" name="Picture 2">
-              <a:extLst>
-                <a:ext uri="{FF2B5EF4-FFF2-40B4-BE49-F238E27FC236}">
-                  <a16:creationId xmlns:a16="http://schemas.microsoft.com/office/drawing/2014/main" id="{4846971D-A1F0-4414-918B-881899EFC861}"/>
-                </a:ext>
-              </a:extLst>
-            </p:cNvPr>
-            <p:cNvPicPr>
-              <a:picLocks noChangeAspect="1" noChangeArrowheads="1"/>
-            </p:cNvPicPr>
-            <p:nvPr/>
-          </p:nvPicPr>
-          <p:blipFill>
-            <a:blip r:embed="rId2" cstate="print">
-              <a:extLst>
-                <a:ext uri="{28A0092B-C50C-407E-A947-70E740481C1C}">
-                  <a14:useLocalDpi xmlns:a14="http://schemas.microsoft.com/office/drawing/2010/main" val="0"/>
-                </a:ext>
-              </a:extLst>
-            </a:blip>
-            <a:srcRect/>
-            <a:stretch>
-              <a:fillRect/>
-            </a:stretch>
-          </p:blipFill>
-          <p:spPr bwMode="auto">
-            <a:xfrm>
-              <a:off x="2512807" y="1603456"/>
-              <a:ext cx="662689" cy="662689"/>
-            </a:xfrm>
-            <a:prstGeom prst="rect">
-              <a:avLst/>
-            </a:prstGeom>
-            <a:noFill/>
-            <a:extLst>
-              <a:ext uri="{909E8E84-426E-40DD-AFC4-6F175D3DCCD1}">
-                <a14:hiddenFill xmlns:a14="http://schemas.microsoft.com/office/drawing/2010/main">
-                  <a:solidFill>
-                    <a:srgbClr val="FFFFFF"/>
-                  </a:solidFill>
-                </a14:hiddenFill>
-              </a:ext>
-            </a:extLst>
-          </p:spPr>
-        </p:pic>
-        <p:sp>
-          <p:nvSpPr>
-            <p:cNvPr id="40" name="TextBox 39">
-              <a:extLst>
-                <a:ext uri="{FF2B5EF4-FFF2-40B4-BE49-F238E27FC236}">
-                  <a16:creationId xmlns:a16="http://schemas.microsoft.com/office/drawing/2014/main" id="{206166BC-4175-42C8-9880-A6309BB2EE82}"/>
-                </a:ext>
-              </a:extLst>
-            </p:cNvPr>
-            <p:cNvSpPr txBox="1"/>
-            <p:nvPr/>
-          </p:nvSpPr>
-          <p:spPr>
-            <a:xfrm>
-              <a:off x="1811039" y="1300849"/>
-              <a:ext cx="2066223" cy="369332"/>
-            </a:xfrm>
-            <a:prstGeom prst="rect">
-              <a:avLst/>
-            </a:prstGeom>
-            <a:noFill/>
-          </p:spPr>
-          <p:txBody>
-            <a:bodyPr wrap="square" rtlCol="0">
-              <a:spAutoFit/>
-            </a:bodyPr>
-            <a:lstStyle/>
-            <a:p>
-              <a:pPr algn="ctr"/>
-              <a:r>
-                <a:rPr lang="en-US"/>
-                <a:t>vignetteMaps</a:t>
-              </a:r>
-            </a:p>
-          </p:txBody>
-        </p:sp>
-      </p:grpSp>
-      <p:grpSp>
-        <p:nvGrpSpPr>
-          <p:cNvPr id="41" name="Group 40">
-            <a:extLst>
-              <a:ext uri="{FF2B5EF4-FFF2-40B4-BE49-F238E27FC236}">
-                <a16:creationId xmlns:a16="http://schemas.microsoft.com/office/drawing/2014/main" id="{639D9C17-B8EC-4A42-96C6-DDC4A39CDF4B}"/>
-              </a:ext>
-            </a:extLst>
-          </p:cNvPr>
-          <p:cNvGrpSpPr/>
-          <p:nvPr/>
-        </p:nvGrpSpPr>
-        <p:grpSpPr>
-          <a:xfrm>
-            <a:off x="3579661" y="658374"/>
-            <a:ext cx="2066223" cy="965296"/>
-            <a:chOff x="1811039" y="1300849"/>
-            <a:chExt cx="2066223" cy="965296"/>
-          </a:xfrm>
-        </p:grpSpPr>
-        <p:pic>
-          <p:nvPicPr>
-            <p:cNvPr id="42" name="Picture 2">
-              <a:extLst>
-                <a:ext uri="{FF2B5EF4-FFF2-40B4-BE49-F238E27FC236}">
-                  <a16:creationId xmlns:a16="http://schemas.microsoft.com/office/drawing/2014/main" id="{B10A292F-F2D2-4F8C-B6C8-26CB27C674FD}"/>
-                </a:ext>
-              </a:extLst>
-            </p:cNvPr>
-            <p:cNvPicPr>
-              <a:picLocks noChangeAspect="1" noChangeArrowheads="1"/>
-            </p:cNvPicPr>
-            <p:nvPr/>
-          </p:nvPicPr>
-          <p:blipFill>
-            <a:blip r:embed="rId2" cstate="print">
-              <a:extLst>
-                <a:ext uri="{28A0092B-C50C-407E-A947-70E740481C1C}">
-                  <a14:useLocalDpi xmlns:a14="http://schemas.microsoft.com/office/drawing/2010/main" val="0"/>
-                </a:ext>
-              </a:extLst>
-            </a:blip>
-            <a:srcRect/>
-            <a:stretch>
-              <a:fillRect/>
-            </a:stretch>
-          </p:blipFill>
-          <p:spPr bwMode="auto">
-            <a:xfrm>
-              <a:off x="2512807" y="1603456"/>
-              <a:ext cx="662689" cy="662689"/>
-            </a:xfrm>
-            <a:prstGeom prst="rect">
-              <a:avLst/>
-            </a:prstGeom>
-            <a:noFill/>
-            <a:extLst>
-              <a:ext uri="{909E8E84-426E-40DD-AFC4-6F175D3DCCD1}">
-                <a14:hiddenFill xmlns:a14="http://schemas.microsoft.com/office/drawing/2010/main">
-                  <a:solidFill>
-                    <a:srgbClr val="FFFFFF"/>
-                  </a:solidFill>
-                </a14:hiddenFill>
-              </a:ext>
-            </a:extLst>
-          </p:spPr>
-        </p:pic>
-        <p:sp>
-          <p:nvSpPr>
-            <p:cNvPr id="43" name="TextBox 42">
-              <a:extLst>
-                <a:ext uri="{FF2B5EF4-FFF2-40B4-BE49-F238E27FC236}">
-                  <a16:creationId xmlns:a16="http://schemas.microsoft.com/office/drawing/2014/main" id="{FA136A0A-1C41-483B-BCE8-022C3600A6D3}"/>
-                </a:ext>
-              </a:extLst>
-            </p:cNvPr>
-            <p:cNvSpPr txBox="1"/>
-            <p:nvPr/>
-          </p:nvSpPr>
-          <p:spPr>
-            <a:xfrm>
-              <a:off x="1811039" y="1300849"/>
-              <a:ext cx="2066223" cy="369332"/>
-            </a:xfrm>
-            <a:prstGeom prst="rect">
-              <a:avLst/>
-            </a:prstGeom>
-            <a:noFill/>
-          </p:spPr>
-          <p:txBody>
-            <a:bodyPr wrap="square" rtlCol="0">
-              <a:spAutoFit/>
-            </a:bodyPr>
-            <a:lstStyle/>
-            <a:p>
-              <a:pPr algn="ctr"/>
-              <a:r>
-                <a:rPr lang="en-US"/>
-                <a:t>Maps</a:t>
-              </a:r>
-            </a:p>
-          </p:txBody>
-        </p:sp>
-      </p:grpSp>
-      <p:grpSp>
-        <p:nvGrpSpPr>
-          <p:cNvPr id="44" name="Group 43">
-            <a:extLst>
-              <a:ext uri="{FF2B5EF4-FFF2-40B4-BE49-F238E27FC236}">
-                <a16:creationId xmlns:a16="http://schemas.microsoft.com/office/drawing/2014/main" id="{1D032C99-582A-4AA2-953C-8BBA7AB0E0FD}"/>
-              </a:ext>
-            </a:extLst>
-          </p:cNvPr>
-          <p:cNvGrpSpPr/>
-          <p:nvPr/>
-        </p:nvGrpSpPr>
-        <p:grpSpPr>
-          <a:xfrm>
-            <a:off x="2590799" y="2116066"/>
-            <a:ext cx="3379322" cy="915970"/>
-            <a:chOff x="845844" y="5240779"/>
-            <a:chExt cx="3379322" cy="915970"/>
-          </a:xfrm>
-        </p:grpSpPr>
-        <p:pic>
-          <p:nvPicPr>
-            <p:cNvPr id="47" name="Picture 46">
-              <a:extLst>
-                <a:ext uri="{FF2B5EF4-FFF2-40B4-BE49-F238E27FC236}">
-                  <a16:creationId xmlns:a16="http://schemas.microsoft.com/office/drawing/2014/main" id="{2E489255-62ED-4D07-B96F-F5F52E9A0A4D}"/>
-                </a:ext>
-              </a:extLst>
-            </p:cNvPr>
-            <p:cNvPicPr>
-              <a:picLocks noChangeAspect="1"/>
-            </p:cNvPicPr>
-            <p:nvPr/>
-          </p:nvPicPr>
-          <p:blipFill>
-            <a:blip r:embed="rId4"/>
-            <a:stretch>
-              <a:fillRect/>
-            </a:stretch>
-          </p:blipFill>
-          <p:spPr>
-            <a:xfrm>
-              <a:off x="855611" y="5240779"/>
-              <a:ext cx="3305457" cy="915970"/>
-            </a:xfrm>
-            <a:prstGeom prst="rect">
-              <a:avLst/>
-            </a:prstGeom>
-            <a:ln w="3175">
-              <a:noFill/>
-            </a:ln>
-          </p:spPr>
-        </p:pic>
-        <p:sp>
-          <p:nvSpPr>
-            <p:cNvPr id="46" name="Rectangle 45">
-              <a:extLst>
-                <a:ext uri="{FF2B5EF4-FFF2-40B4-BE49-F238E27FC236}">
-                  <a16:creationId xmlns:a16="http://schemas.microsoft.com/office/drawing/2014/main" id="{E5C47865-993C-4360-B418-AC65E1C2BD8C}"/>
-                </a:ext>
-              </a:extLst>
-            </p:cNvPr>
-            <p:cNvSpPr/>
-            <p:nvPr/>
-          </p:nvSpPr>
-          <p:spPr>
-            <a:xfrm>
-              <a:off x="845844" y="5240779"/>
-              <a:ext cx="3379322" cy="915970"/>
-            </a:xfrm>
-            <a:prstGeom prst="rect">
-              <a:avLst/>
-            </a:prstGeom>
-            <a:noFill/>
-            <a:ln w="3175">
-              <a:solidFill>
-                <a:schemeClr val="bg1">
-                  <a:lumMod val="65000"/>
-                </a:schemeClr>
-              </a:solidFill>
-            </a:ln>
-          </p:spPr>
-          <p:style>
-            <a:lnRef idx="2">
-              <a:schemeClr val="accent1">
-                <a:shade val="50000"/>
-              </a:schemeClr>
-            </a:lnRef>
-            <a:fillRef idx="1">
-              <a:schemeClr val="accent1"/>
-            </a:fillRef>
-            <a:effectRef idx="0">
-              <a:schemeClr val="accent1"/>
-            </a:effectRef>
-            <a:fontRef idx="minor">
-              <a:schemeClr val="lt1"/>
-            </a:fontRef>
-          </p:style>
-          <p:txBody>
-            <a:bodyPr rtlCol="0" anchor="ctr"/>
-            <a:lstStyle/>
-            <a:p>
-              <a:pPr algn="ctr"/>
-              <a:endParaRPr lang="en-US"/>
-            </a:p>
-          </p:txBody>
-        </p:sp>
-      </p:grpSp>
-      <p:cxnSp>
-        <p:nvCxnSpPr>
-          <p:cNvPr id="54" name="Straight Connector 53">
-            <a:extLst>
-              <a:ext uri="{FF2B5EF4-FFF2-40B4-BE49-F238E27FC236}">
-                <a16:creationId xmlns:a16="http://schemas.microsoft.com/office/drawing/2014/main" id="{E0E679EA-6F28-4D22-8980-8B71467381CD}"/>
-              </a:ext>
-            </a:extLst>
-          </p:cNvPr>
-          <p:cNvCxnSpPr>
-            <a:cxnSpLocks/>
-          </p:cNvCxnSpPr>
-          <p:nvPr/>
-        </p:nvCxnSpPr>
-        <p:spPr>
-          <a:xfrm>
-            <a:off x="3828332" y="1292326"/>
-            <a:ext cx="329272" cy="0"/>
-          </a:xfrm>
-          <a:prstGeom prst="line">
-            <a:avLst/>
-          </a:prstGeom>
-          <a:ln>
-            <a:tailEnd type="triangle" w="lg" len="lg"/>
-          </a:ln>
-        </p:spPr>
-        <p:style>
-          <a:lnRef idx="1">
-            <a:schemeClr val="dk1"/>
-          </a:lnRef>
-          <a:fillRef idx="0">
-            <a:schemeClr val="dk1"/>
-          </a:fillRef>
-          <a:effectRef idx="0">
-            <a:schemeClr val="dk1"/>
-          </a:effectRef>
-          <a:fontRef idx="minor">
-            <a:schemeClr val="tx1"/>
-          </a:fontRef>
-        </p:style>
-      </p:cxnSp>
-      <p:cxnSp>
-        <p:nvCxnSpPr>
-          <p:cNvPr id="55" name="Straight Connector 54">
-            <a:extLst>
-              <a:ext uri="{FF2B5EF4-FFF2-40B4-BE49-F238E27FC236}">
-                <a16:creationId xmlns:a16="http://schemas.microsoft.com/office/drawing/2014/main" id="{C5F4F747-8F17-41A4-BCC2-9F18EAB58AFE}"/>
-              </a:ext>
-            </a:extLst>
-          </p:cNvPr>
-          <p:cNvCxnSpPr>
-            <a:cxnSpLocks/>
-          </p:cNvCxnSpPr>
-          <p:nvPr/>
-        </p:nvCxnSpPr>
-        <p:spPr>
-          <a:xfrm>
-            <a:off x="4926575" y="1283537"/>
-            <a:ext cx="329272" cy="0"/>
-          </a:xfrm>
-          <a:prstGeom prst="line">
-            <a:avLst/>
-          </a:prstGeom>
-          <a:ln>
-            <a:tailEnd type="triangle" w="lg" len="lg"/>
-          </a:ln>
-        </p:spPr>
-        <p:style>
-          <a:lnRef idx="1">
-            <a:schemeClr val="dk1"/>
-          </a:lnRef>
-          <a:fillRef idx="0">
-            <a:schemeClr val="dk1"/>
-          </a:fillRef>
-          <a:effectRef idx="0">
-            <a:schemeClr val="dk1"/>
-          </a:effectRef>
-          <a:fontRef idx="minor">
-            <a:schemeClr val="tx1"/>
-          </a:fontRef>
-        </p:style>
-      </p:cxnSp>
-      <p:cxnSp>
-        <p:nvCxnSpPr>
-          <p:cNvPr id="56" name="Straight Connector 55">
-            <a:extLst>
-              <a:ext uri="{FF2B5EF4-FFF2-40B4-BE49-F238E27FC236}">
-                <a16:creationId xmlns:a16="http://schemas.microsoft.com/office/drawing/2014/main" id="{56E2EC1C-12E5-4B65-8CA0-C584C78658DE}"/>
-              </a:ext>
-            </a:extLst>
-          </p:cNvPr>
-          <p:cNvCxnSpPr>
-            <a:cxnSpLocks/>
-          </p:cNvCxnSpPr>
-          <p:nvPr/>
-        </p:nvCxnSpPr>
-        <p:spPr>
-          <a:xfrm>
-            <a:off x="2747233" y="1308936"/>
-            <a:ext cx="329272" cy="0"/>
-          </a:xfrm>
-          <a:prstGeom prst="line">
-            <a:avLst/>
-          </a:prstGeom>
-          <a:ln>
-            <a:tailEnd type="triangle" w="lg" len="lg"/>
-          </a:ln>
-        </p:spPr>
-        <p:style>
-          <a:lnRef idx="1">
-            <a:schemeClr val="dk1"/>
-          </a:lnRef>
-          <a:fillRef idx="0">
-            <a:schemeClr val="dk1"/>
-          </a:fillRef>
-          <a:effectRef idx="0">
-            <a:schemeClr val="dk1"/>
-          </a:effectRef>
-          <a:fontRef idx="minor">
-            <a:schemeClr val="tx1"/>
-          </a:fontRef>
-        </p:style>
-      </p:cxnSp>
-      <p:pic>
-        <p:nvPicPr>
-          <p:cNvPr id="11" name="Picture 10">
-            <a:extLst>
-              <a:ext uri="{FF2B5EF4-FFF2-40B4-BE49-F238E27FC236}">
-                <a16:creationId xmlns:a16="http://schemas.microsoft.com/office/drawing/2014/main" id="{816C33D0-7E74-44E4-A365-379762994A31}"/>
-              </a:ext>
-            </a:extLst>
-          </p:cNvPr>
-          <p:cNvPicPr>
-            <a:picLocks noChangeAspect="1"/>
-          </p:cNvPicPr>
-          <p:nvPr/>
-        </p:nvPicPr>
-        <p:blipFill>
-          <a:blip r:embed="rId5"/>
-          <a:stretch>
-            <a:fillRect/>
-          </a:stretch>
-        </p:blipFill>
-        <p:spPr>
-          <a:xfrm>
-            <a:off x="5091210" y="3841924"/>
-            <a:ext cx="5130247" cy="1499751"/>
-          </a:xfrm>
-          <a:prstGeom prst="rect">
-            <a:avLst/>
-          </a:prstGeom>
-          <a:noFill/>
-          <a:ln w="3175">
-            <a:solidFill>
-              <a:schemeClr val="bg1">
-                <a:lumMod val="65000"/>
-              </a:schemeClr>
-            </a:solidFill>
-          </a:ln>
-        </p:spPr>
-      </p:pic>
-      <p:cxnSp>
-        <p:nvCxnSpPr>
-          <p:cNvPr id="58" name="Connector: Elbow 57">
-            <a:extLst>
-              <a:ext uri="{FF2B5EF4-FFF2-40B4-BE49-F238E27FC236}">
-                <a16:creationId xmlns:a16="http://schemas.microsoft.com/office/drawing/2014/main" id="{55CB0F6D-FCBE-472D-A844-E8DAAE68B680}"/>
-              </a:ext>
-            </a:extLst>
-          </p:cNvPr>
-          <p:cNvCxnSpPr>
-            <a:cxnSpLocks/>
-            <a:stCxn id="63" idx="1"/>
-            <a:endCxn id="10" idx="0"/>
-          </p:cNvCxnSpPr>
-          <p:nvPr/>
-        </p:nvCxnSpPr>
-        <p:spPr>
-          <a:xfrm rot="10800000" flipV="1">
-            <a:off x="2278516" y="2341500"/>
-            <a:ext cx="463693" cy="1450859"/>
-          </a:xfrm>
-          <a:prstGeom prst="bentConnector2">
-            <a:avLst/>
-          </a:prstGeom>
-          <a:ln>
-            <a:tailEnd type="triangle" w="lg" len="lg"/>
-          </a:ln>
-        </p:spPr>
-        <p:style>
-          <a:lnRef idx="1">
-            <a:schemeClr val="dk1"/>
-          </a:lnRef>
-          <a:fillRef idx="0">
-            <a:schemeClr val="dk1"/>
-          </a:fillRef>
-          <a:effectRef idx="0">
-            <a:schemeClr val="dk1"/>
-          </a:effectRef>
-          <a:fontRef idx="minor">
-            <a:schemeClr val="tx1"/>
-          </a:fontRef>
-        </p:style>
-      </p:cxnSp>
-      <p:cxnSp>
-        <p:nvCxnSpPr>
-          <p:cNvPr id="59" name="Connector: Elbow 58">
-            <a:extLst>
-              <a:ext uri="{FF2B5EF4-FFF2-40B4-BE49-F238E27FC236}">
-                <a16:creationId xmlns:a16="http://schemas.microsoft.com/office/drawing/2014/main" id="{41670ED7-D092-4BC3-8368-B7B8701E055E}"/>
-              </a:ext>
-            </a:extLst>
-          </p:cNvPr>
-          <p:cNvCxnSpPr>
-            <a:cxnSpLocks/>
-            <a:stCxn id="67" idx="2"/>
-            <a:endCxn id="11" idx="0"/>
-          </p:cNvCxnSpPr>
-          <p:nvPr/>
-        </p:nvCxnSpPr>
-        <p:spPr>
-          <a:xfrm rot="16200000" flipH="1">
-            <a:off x="4763876" y="949465"/>
-            <a:ext cx="1004443" cy="4780474"/>
-          </a:xfrm>
-          <a:prstGeom prst="bentConnector3">
-            <a:avLst>
-              <a:gd name="adj1" fmla="val 50000"/>
-            </a:avLst>
-          </a:prstGeom>
-          <a:ln>
-            <a:tailEnd type="triangle" w="lg" len="lg"/>
-          </a:ln>
-        </p:spPr>
-        <p:style>
-          <a:lnRef idx="1">
-            <a:schemeClr val="dk1"/>
-          </a:lnRef>
-          <a:fillRef idx="0">
-            <a:schemeClr val="dk1"/>
-          </a:fillRef>
-          <a:effectRef idx="0">
-            <a:schemeClr val="dk1"/>
-          </a:effectRef>
-          <a:fontRef idx="minor">
-            <a:schemeClr val="tx1"/>
-          </a:fontRef>
-        </p:style>
-      </p:cxnSp>
-      <p:sp>
-        <p:nvSpPr>
-          <p:cNvPr id="63" name="Rectangle 62">
-            <a:extLst>
-              <a:ext uri="{FF2B5EF4-FFF2-40B4-BE49-F238E27FC236}">
-                <a16:creationId xmlns:a16="http://schemas.microsoft.com/office/drawing/2014/main" id="{ED1AB39C-ABA6-48D7-A658-CB34A1979715}"/>
-              </a:ext>
-            </a:extLst>
-          </p:cNvPr>
-          <p:cNvSpPr/>
-          <p:nvPr/>
-        </p:nvSpPr>
-        <p:spPr>
-          <a:xfrm>
-            <a:off x="2742208" y="2235593"/>
-            <a:ext cx="319668" cy="211816"/>
-          </a:xfrm>
-          <a:prstGeom prst="rect">
-            <a:avLst/>
-          </a:prstGeom>
-          <a:noFill/>
-          <a:ln>
-            <a:noFill/>
           </a:ln>
         </p:spPr>
         <p:style>
@@ -6402,69 +5259,19 @@
       </p:sp>
       <p:sp>
         <p:nvSpPr>
-          <p:cNvPr id="67" name="Rectangle 66">
-            <a:extLst>
-              <a:ext uri="{FF2B5EF4-FFF2-40B4-BE49-F238E27FC236}">
-                <a16:creationId xmlns:a16="http://schemas.microsoft.com/office/drawing/2014/main" id="{DAD011A5-C6B1-4E5C-B519-703514F72C6B}"/>
-              </a:ext>
-            </a:extLst>
-          </p:cNvPr>
-          <p:cNvSpPr/>
+          <p:cNvPr id="7" name="TextBox 6">
+            <a:extLst>
+              <a:ext uri="{FF2B5EF4-FFF2-40B4-BE49-F238E27FC236}">
+                <a16:creationId xmlns:a16="http://schemas.microsoft.com/office/drawing/2014/main" id="{A063DF1C-7DF0-40B4-AC9D-EC918B0CB000}"/>
+              </a:ext>
+            </a:extLst>
+          </p:cNvPr>
+          <p:cNvSpPr txBox="1"/>
           <p:nvPr/>
         </p:nvSpPr>
         <p:spPr>
           <a:xfrm>
-            <a:off x="2716026" y="2625665"/>
-            <a:ext cx="319668" cy="211816"/>
-          </a:xfrm>
-          <a:prstGeom prst="rect">
-            <a:avLst/>
-          </a:prstGeom>
-          <a:noFill/>
-          <a:ln>
-            <a:noFill/>
-          </a:ln>
-        </p:spPr>
-        <p:style>
-          <a:lnRef idx="2">
-            <a:schemeClr val="accent1">
-              <a:shade val="50000"/>
-            </a:schemeClr>
-          </a:lnRef>
-          <a:fillRef idx="1">
-            <a:schemeClr val="accent1"/>
-          </a:fillRef>
-          <a:effectRef idx="0">
-            <a:schemeClr val="accent1"/>
-          </a:effectRef>
-          <a:fontRef idx="minor">
-            <a:schemeClr val="lt1"/>
-          </a:fontRef>
-        </p:style>
-        <p:txBody>
-          <a:bodyPr rtlCol="0" anchor="ctr"/>
-          <a:lstStyle/>
-          <a:p>
-            <a:pPr algn="ctr"/>
-            <a:endParaRPr lang="en-US"/>
-          </a:p>
-        </p:txBody>
-      </p:sp>
-      <p:sp>
-        <p:nvSpPr>
-          <p:cNvPr id="71" name="TextBox 70">
-            <a:extLst>
-              <a:ext uri="{FF2B5EF4-FFF2-40B4-BE49-F238E27FC236}">
-                <a16:creationId xmlns:a16="http://schemas.microsoft.com/office/drawing/2014/main" id="{13457808-A9BC-45D9-85EC-E21DC0652682}"/>
-              </a:ext>
-            </a:extLst>
-          </p:cNvPr>
-          <p:cNvSpPr txBox="1"/>
-          <p:nvPr/>
-        </p:nvSpPr>
-        <p:spPr>
-          <a:xfrm>
-            <a:off x="357539" y="1036882"/>
+            <a:off x="192163" y="128664"/>
             <a:ext cx="2066223" cy="369332"/>
           </a:xfrm>
           <a:prstGeom prst="rect">
@@ -6480,70 +5287,52 @@
           <a:p>
             <a:pPr algn="ctr"/>
             <a:r>
-              <a:rPr lang="en-US"/>
-              <a:t>Working Dir: </a:t>
+              <a:rPr lang="en-US" b="1"/>
+              <a:t>US 49</a:t>
             </a:r>
           </a:p>
         </p:txBody>
       </p:sp>
-      <p:sp>
-        <p:nvSpPr>
-          <p:cNvPr id="73" name="Rectangle 72">
-            <a:extLst>
-              <a:ext uri="{FF2B5EF4-FFF2-40B4-BE49-F238E27FC236}">
-                <a16:creationId xmlns:a16="http://schemas.microsoft.com/office/drawing/2014/main" id="{930E4700-1C44-4D30-BD57-623D230534D0}"/>
-              </a:ext>
-            </a:extLst>
-          </p:cNvPr>
-          <p:cNvSpPr/>
-          <p:nvPr/>
-        </p:nvSpPr>
-        <p:spPr>
-          <a:xfrm>
-            <a:off x="139429" y="397311"/>
-            <a:ext cx="10290446" cy="5168363"/>
+      <p:pic>
+        <p:nvPicPr>
+          <p:cNvPr id="3" name="Picture 2" descr="A close up of a map&#10;&#10;Description automatically generated">
+            <a:extLst>
+              <a:ext uri="{FF2B5EF4-FFF2-40B4-BE49-F238E27FC236}">
+                <a16:creationId xmlns:a16="http://schemas.microsoft.com/office/drawing/2014/main" id="{F0BE566E-E55C-43E6-BCAA-3FA9D0A651E5}"/>
+              </a:ext>
+            </a:extLst>
+          </p:cNvPr>
+          <p:cNvPicPr>
+            <a:picLocks noChangeAspect="1"/>
+          </p:cNvPicPr>
+          <p:nvPr/>
+        </p:nvPicPr>
+        <p:blipFill>
+          <a:blip r:embed="rId2">
+            <a:extLst>
+              <a:ext uri="{28A0092B-C50C-407E-A947-70E740481C1C}">
+                <a14:useLocalDpi xmlns:a14="http://schemas.microsoft.com/office/drawing/2010/main" val="0"/>
+              </a:ext>
+            </a:extLst>
+          </a:blip>
+          <a:stretch>
+            <a:fillRect/>
+          </a:stretch>
+        </p:blipFill>
+        <p:spPr>
+          <a:xfrm>
+            <a:off x="1243776" y="789197"/>
+            <a:ext cx="9704448" cy="4739535"/>
           </a:xfrm>
           <a:prstGeom prst="rect">
             <a:avLst/>
           </a:prstGeom>
-          <a:noFill/>
-          <a:ln>
-            <a:solidFill>
-              <a:schemeClr val="bg1">
-                <a:lumMod val="65000"/>
-              </a:schemeClr>
-            </a:solidFill>
-          </a:ln>
-        </p:spPr>
-        <p:style>
-          <a:lnRef idx="2">
-            <a:schemeClr val="accent1">
-              <a:shade val="50000"/>
-            </a:schemeClr>
-          </a:lnRef>
-          <a:fillRef idx="1">
-            <a:schemeClr val="accent1"/>
-          </a:fillRef>
-          <a:effectRef idx="0">
-            <a:schemeClr val="accent1"/>
-          </a:effectRef>
-          <a:fontRef idx="minor">
-            <a:schemeClr val="lt1"/>
-          </a:fontRef>
-        </p:style>
-        <p:txBody>
-          <a:bodyPr rtlCol="0" anchor="ctr"/>
-          <a:lstStyle/>
-          <a:p>
-            <a:pPr algn="ctr"/>
-            <a:endParaRPr lang="en-US"/>
-          </a:p>
-        </p:txBody>
-      </p:sp>
+        </p:spPr>
+      </p:pic>
     </p:spTree>
     <p:extLst>
       <p:ext uri="{BB962C8B-B14F-4D97-AF65-F5344CB8AC3E}">
-        <p14:creationId xmlns:p14="http://schemas.microsoft.com/office/powerpoint/2010/main" val="1189941159"/>
+        <p14:creationId xmlns:p14="http://schemas.microsoft.com/office/powerpoint/2010/main" val="3140732755"/>
       </p:ext>
     </p:extLst>
   </p:cSld>
@@ -6655,17 +5444,17 @@
             <a:pPr algn="ctr"/>
             <a:r>
               <a:rPr lang="en-US" b="1"/>
-              <a:t>US 49</a:t>
+              <a:t>US 49 Counties</a:t>
             </a:r>
           </a:p>
         </p:txBody>
       </p:sp>
       <p:pic>
         <p:nvPicPr>
-          <p:cNvPr id="3" name="Picture 2" descr="A close up of a map&#10;&#10;Description automatically generated">
-            <a:extLst>
-              <a:ext uri="{FF2B5EF4-FFF2-40B4-BE49-F238E27FC236}">
-                <a16:creationId xmlns:a16="http://schemas.microsoft.com/office/drawing/2014/main" id="{F0BE566E-E55C-43E6-BCAA-3FA9D0A651E5}"/>
+          <p:cNvPr id="4" name="Picture 3" descr="A picture containing text, map&#10;&#10;Description automatically generated">
+            <a:extLst>
+              <a:ext uri="{FF2B5EF4-FFF2-40B4-BE49-F238E27FC236}">
+                <a16:creationId xmlns:a16="http://schemas.microsoft.com/office/drawing/2014/main" id="{B0863DB6-9151-47C5-9FEA-E0593352C298}"/>
               </a:ext>
             </a:extLst>
           </p:cNvPr>
@@ -6688,8 +5477,8 @@
         </p:blipFill>
         <p:spPr>
           <a:xfrm>
-            <a:off x="1243776" y="789197"/>
-            <a:ext cx="9704448" cy="4739535"/>
+            <a:off x="1001831" y="675324"/>
+            <a:ext cx="10188338" cy="4975861"/>
           </a:xfrm>
           <a:prstGeom prst="rect">
             <a:avLst/>
@@ -6699,7 +5488,7 @@
     </p:spTree>
     <p:extLst>
       <p:ext uri="{BB962C8B-B14F-4D97-AF65-F5344CB8AC3E}">
-        <p14:creationId xmlns:p14="http://schemas.microsoft.com/office/powerpoint/2010/main" val="3140732755"/>
+        <p14:creationId xmlns:p14="http://schemas.microsoft.com/office/powerpoint/2010/main" val="2821112866"/>
       </p:ext>
     </p:extLst>
   </p:cSld>
@@ -6811,17 +5600,17 @@
             <a:pPr algn="ctr"/>
             <a:r>
               <a:rPr lang="en-US" b="1"/>
-              <a:t>US 49 Counties</a:t>
+              <a:t>US 52</a:t>
             </a:r>
           </a:p>
         </p:txBody>
       </p:sp>
       <p:pic>
         <p:nvPicPr>
-          <p:cNvPr id="4" name="Picture 3" descr="A picture containing text, map&#10;&#10;Description automatically generated">
-            <a:extLst>
-              <a:ext uri="{FF2B5EF4-FFF2-40B4-BE49-F238E27FC236}">
-                <a16:creationId xmlns:a16="http://schemas.microsoft.com/office/drawing/2014/main" id="{B0863DB6-9151-47C5-9FEA-E0593352C298}"/>
+          <p:cNvPr id="3" name="Picture 2" descr="A close up of a map&#10;&#10;Description automatically generated">
+            <a:extLst>
+              <a:ext uri="{FF2B5EF4-FFF2-40B4-BE49-F238E27FC236}">
+                <a16:creationId xmlns:a16="http://schemas.microsoft.com/office/drawing/2014/main" id="{1525D342-6CAB-4FAB-98E3-F3F23F09ECB5}"/>
               </a:ext>
             </a:extLst>
           </p:cNvPr>
@@ -6844,8 +5633,8 @@
         </p:blipFill>
         <p:spPr>
           <a:xfrm>
-            <a:off x="1001831" y="675324"/>
-            <a:ext cx="10188338" cy="4975861"/>
+            <a:off x="1866726" y="675957"/>
+            <a:ext cx="8458548" cy="4974596"/>
           </a:xfrm>
           <a:prstGeom prst="rect">
             <a:avLst/>
@@ -6855,7 +5644,7 @@
     </p:spTree>
     <p:extLst>
       <p:ext uri="{BB962C8B-B14F-4D97-AF65-F5344CB8AC3E}">
-        <p14:creationId xmlns:p14="http://schemas.microsoft.com/office/powerpoint/2010/main" val="2821112866"/>
+        <p14:creationId xmlns:p14="http://schemas.microsoft.com/office/powerpoint/2010/main" val="948249206"/>
       </p:ext>
     </p:extLst>
   </p:cSld>
@@ -6882,6 +5671,42 @@
           <a:chExt cx="0" cy="0"/>
         </a:xfrm>
       </p:grpSpPr>
+      <p:pic>
+        <p:nvPicPr>
+          <p:cNvPr id="5" name="Picture 4" descr="A picture containing text, map&#10;&#10;Description automatically generated">
+            <a:extLst>
+              <a:ext uri="{FF2B5EF4-FFF2-40B4-BE49-F238E27FC236}">
+                <a16:creationId xmlns:a16="http://schemas.microsoft.com/office/drawing/2014/main" id="{2F299C4D-8DB8-4491-8191-7839F08FADAD}"/>
+              </a:ext>
+            </a:extLst>
+          </p:cNvPr>
+          <p:cNvPicPr>
+            <a:picLocks noChangeAspect="1"/>
+          </p:cNvPicPr>
+          <p:nvPr/>
+        </p:nvPicPr>
+        <p:blipFill>
+          <a:blip r:embed="rId2">
+            <a:extLst>
+              <a:ext uri="{28A0092B-C50C-407E-A947-70E740481C1C}">
+                <a14:useLocalDpi xmlns:a14="http://schemas.microsoft.com/office/drawing/2010/main" val="0"/>
+              </a:ext>
+            </a:extLst>
+          </a:blip>
+          <a:stretch>
+            <a:fillRect/>
+          </a:stretch>
+        </p:blipFill>
+        <p:spPr>
+          <a:xfrm>
+            <a:off x="317652" y="1110563"/>
+            <a:ext cx="11299673" cy="4206503"/>
+          </a:xfrm>
+          <a:prstGeom prst="rect">
+            <a:avLst/>
+          </a:prstGeom>
+        </p:spPr>
+      </p:pic>
       <p:sp>
         <p:nvSpPr>
           <p:cNvPr id="6" name="Rectangle 5">
@@ -6967,51 +5792,15 @@
             <a:pPr algn="ctr"/>
             <a:r>
               <a:rPr lang="en-US" b="1"/>
-              <a:t>US 52</a:t>
+              <a:t>GCAM Reg 32</a:t>
             </a:r>
           </a:p>
         </p:txBody>
       </p:sp>
-      <p:pic>
-        <p:nvPicPr>
-          <p:cNvPr id="3" name="Picture 2" descr="A close up of a map&#10;&#10;Description automatically generated">
-            <a:extLst>
-              <a:ext uri="{FF2B5EF4-FFF2-40B4-BE49-F238E27FC236}">
-                <a16:creationId xmlns:a16="http://schemas.microsoft.com/office/drawing/2014/main" id="{1525D342-6CAB-4FAB-98E3-F3F23F09ECB5}"/>
-              </a:ext>
-            </a:extLst>
-          </p:cNvPr>
-          <p:cNvPicPr>
-            <a:picLocks noChangeAspect="1"/>
-          </p:cNvPicPr>
-          <p:nvPr/>
-        </p:nvPicPr>
-        <p:blipFill>
-          <a:blip r:embed="rId2">
-            <a:extLst>
-              <a:ext uri="{28A0092B-C50C-407E-A947-70E740481C1C}">
-                <a14:useLocalDpi xmlns:a14="http://schemas.microsoft.com/office/drawing/2010/main" val="0"/>
-              </a:ext>
-            </a:extLst>
-          </a:blip>
-          <a:stretch>
-            <a:fillRect/>
-          </a:stretch>
-        </p:blipFill>
-        <p:spPr>
-          <a:xfrm>
-            <a:off x="1866726" y="675957"/>
-            <a:ext cx="8458548" cy="4974596"/>
-          </a:xfrm>
-          <a:prstGeom prst="rect">
-            <a:avLst/>
-          </a:prstGeom>
-        </p:spPr>
-      </p:pic>
     </p:spTree>
     <p:extLst>
       <p:ext uri="{BB962C8B-B14F-4D97-AF65-F5344CB8AC3E}">
-        <p14:creationId xmlns:p14="http://schemas.microsoft.com/office/powerpoint/2010/main" val="948249206"/>
+        <p14:creationId xmlns:p14="http://schemas.microsoft.com/office/powerpoint/2010/main" val="3180737766"/>
       </p:ext>
     </p:extLst>
   </p:cSld>
@@ -7038,42 +5827,6 @@
           <a:chExt cx="0" cy="0"/>
         </a:xfrm>
       </p:grpSpPr>
-      <p:pic>
-        <p:nvPicPr>
-          <p:cNvPr id="5" name="Picture 4" descr="A picture containing text, map&#10;&#10;Description automatically generated">
-            <a:extLst>
-              <a:ext uri="{FF2B5EF4-FFF2-40B4-BE49-F238E27FC236}">
-                <a16:creationId xmlns:a16="http://schemas.microsoft.com/office/drawing/2014/main" id="{2F299C4D-8DB8-4491-8191-7839F08FADAD}"/>
-              </a:ext>
-            </a:extLst>
-          </p:cNvPr>
-          <p:cNvPicPr>
-            <a:picLocks noChangeAspect="1"/>
-          </p:cNvPicPr>
-          <p:nvPr/>
-        </p:nvPicPr>
-        <p:blipFill>
-          <a:blip r:embed="rId2">
-            <a:extLst>
-              <a:ext uri="{28A0092B-C50C-407E-A947-70E740481C1C}">
-                <a14:useLocalDpi xmlns:a14="http://schemas.microsoft.com/office/drawing/2010/main" val="0"/>
-              </a:ext>
-            </a:extLst>
-          </a:blip>
-          <a:stretch>
-            <a:fillRect/>
-          </a:stretch>
-        </p:blipFill>
-        <p:spPr>
-          <a:xfrm>
-            <a:off x="317652" y="1110563"/>
-            <a:ext cx="11299673" cy="4206503"/>
-          </a:xfrm>
-          <a:prstGeom prst="rect">
-            <a:avLst/>
-          </a:prstGeom>
-        </p:spPr>
-      </p:pic>
       <p:sp>
         <p:nvSpPr>
           <p:cNvPr id="6" name="Rectangle 5">
@@ -7159,15 +5912,51 @@
             <a:pPr algn="ctr"/>
             <a:r>
               <a:rPr lang="en-US" b="1"/>
-              <a:t>GCAM Reg 32</a:t>
+              <a:t>GCAM Basin</a:t>
             </a:r>
           </a:p>
         </p:txBody>
       </p:sp>
+      <p:pic>
+        <p:nvPicPr>
+          <p:cNvPr id="3" name="Picture 2" descr="A picture containing text, map&#10;&#10;Description automatically generated">
+            <a:extLst>
+              <a:ext uri="{FF2B5EF4-FFF2-40B4-BE49-F238E27FC236}">
+                <a16:creationId xmlns:a16="http://schemas.microsoft.com/office/drawing/2014/main" id="{CB9DB4F5-D5A8-4DAD-8173-0963BBFED030}"/>
+              </a:ext>
+            </a:extLst>
+          </p:cNvPr>
+          <p:cNvPicPr>
+            <a:picLocks noChangeAspect="1"/>
+          </p:cNvPicPr>
+          <p:nvPr/>
+        </p:nvPicPr>
+        <p:blipFill>
+          <a:blip r:embed="rId2">
+            <a:extLst>
+              <a:ext uri="{28A0092B-C50C-407E-A947-70E740481C1C}">
+                <a14:useLocalDpi xmlns:a14="http://schemas.microsoft.com/office/drawing/2010/main" val="0"/>
+              </a:ext>
+            </a:extLst>
+          </a:blip>
+          <a:stretch>
+            <a:fillRect/>
+          </a:stretch>
+        </p:blipFill>
+        <p:spPr>
+          <a:xfrm>
+            <a:off x="392149" y="1043599"/>
+            <a:ext cx="11407701" cy="4231134"/>
+          </a:xfrm>
+          <a:prstGeom prst="rect">
+            <a:avLst/>
+          </a:prstGeom>
+        </p:spPr>
+      </p:pic>
     </p:spTree>
     <p:extLst>
       <p:ext uri="{BB962C8B-B14F-4D97-AF65-F5344CB8AC3E}">
-        <p14:creationId xmlns:p14="http://schemas.microsoft.com/office/powerpoint/2010/main" val="3180737766"/>
+        <p14:creationId xmlns:p14="http://schemas.microsoft.com/office/powerpoint/2010/main" val="3624965097"/>
       </p:ext>
     </p:extLst>
   </p:cSld>
@@ -7279,17 +6068,17 @@
             <a:pPr algn="ctr"/>
             <a:r>
               <a:rPr lang="en-US" b="1"/>
-              <a:t>GCAM Basin</a:t>
+              <a:t>World Countries</a:t>
             </a:r>
           </a:p>
         </p:txBody>
       </p:sp>
       <p:pic>
         <p:nvPicPr>
-          <p:cNvPr id="3" name="Picture 2" descr="A picture containing text, map&#10;&#10;Description automatically generated">
-            <a:extLst>
-              <a:ext uri="{FF2B5EF4-FFF2-40B4-BE49-F238E27FC236}">
-                <a16:creationId xmlns:a16="http://schemas.microsoft.com/office/drawing/2014/main" id="{CB9DB4F5-D5A8-4DAD-8173-0963BBFED030}"/>
+          <p:cNvPr id="8" name="Picture 7" descr="A picture containing text, map&#10;&#10;Description automatically generated">
+            <a:extLst>
+              <a:ext uri="{FF2B5EF4-FFF2-40B4-BE49-F238E27FC236}">
+                <a16:creationId xmlns:a16="http://schemas.microsoft.com/office/drawing/2014/main" id="{ABCB02B0-FA9F-499F-AA93-F7A7EF740B04}"/>
               </a:ext>
             </a:extLst>
           </p:cNvPr>
@@ -7312,8 +6101,8 @@
         </p:blipFill>
         <p:spPr>
           <a:xfrm>
-            <a:off x="392149" y="1043599"/>
-            <a:ext cx="11407701" cy="4231134"/>
+            <a:off x="308859" y="1110563"/>
+            <a:ext cx="11592394" cy="4299637"/>
           </a:xfrm>
           <a:prstGeom prst="rect">
             <a:avLst/>
@@ -7323,7 +6112,7 @@
     </p:spTree>
     <p:extLst>
       <p:ext uri="{BB962C8B-B14F-4D97-AF65-F5344CB8AC3E}">
-        <p14:creationId xmlns:p14="http://schemas.microsoft.com/office/powerpoint/2010/main" val="3624965097"/>
+        <p14:creationId xmlns:p14="http://schemas.microsoft.com/office/powerpoint/2010/main" val="3848911443"/>
       </p:ext>
     </p:extLst>
   </p:cSld>
@@ -7435,7 +6224,7 @@
             <a:pPr algn="ctr"/>
             <a:r>
               <a:rPr lang="en-US" b="1"/>
-              <a:t>World Countries</a:t>
+              <a:t>World States</a:t>
             </a:r>
           </a:p>
         </p:txBody>
@@ -7445,7 +6234,7 @@
           <p:cNvPr id="8" name="Picture 7" descr="A picture containing text, map&#10;&#10;Description automatically generated">
             <a:extLst>
               <a:ext uri="{FF2B5EF4-FFF2-40B4-BE49-F238E27FC236}">
-                <a16:creationId xmlns:a16="http://schemas.microsoft.com/office/drawing/2014/main" id="{ABCB02B0-FA9F-499F-AA93-F7A7EF740B04}"/>
+                <a16:creationId xmlns:a16="http://schemas.microsoft.com/office/drawing/2014/main" id="{60D54EB0-F183-4046-810A-E4EEAEBD2598}"/>
               </a:ext>
             </a:extLst>
           </p:cNvPr>
@@ -7468,8 +6257,8 @@
         </p:blipFill>
         <p:spPr>
           <a:xfrm>
-            <a:off x="308859" y="1110563"/>
-            <a:ext cx="11592394" cy="4299637"/>
+            <a:off x="414976" y="1321899"/>
+            <a:ext cx="11362047" cy="4214201"/>
           </a:xfrm>
           <a:prstGeom prst="rect">
             <a:avLst/>
@@ -7479,7 +6268,7 @@
     </p:spTree>
     <p:extLst>
       <p:ext uri="{BB962C8B-B14F-4D97-AF65-F5344CB8AC3E}">
-        <p14:creationId xmlns:p14="http://schemas.microsoft.com/office/powerpoint/2010/main" val="3848911443"/>
+        <p14:creationId xmlns:p14="http://schemas.microsoft.com/office/powerpoint/2010/main" val="636132822"/>
       </p:ext>
     </p:extLst>
   </p:cSld>
@@ -7520,8 +6309,8 @@
         </p:nvSpPr>
         <p:spPr>
           <a:xfrm>
-            <a:off x="192163" y="579074"/>
-            <a:ext cx="11807674" cy="5168363"/>
+            <a:off x="192163" y="1524000"/>
+            <a:ext cx="11807674" cy="3578943"/>
           </a:xfrm>
           <a:prstGeom prst="rect">
             <a:avLst/>
@@ -7591,17 +6380,17 @@
             <a:pPr algn="ctr"/>
             <a:r>
               <a:rPr lang="en-US" b="1"/>
-              <a:t>World States</a:t>
+              <a:t>selectMap</a:t>
             </a:r>
           </a:p>
         </p:txBody>
       </p:sp>
       <p:pic>
         <p:nvPicPr>
-          <p:cNvPr id="8" name="Picture 7" descr="A picture containing text, map&#10;&#10;Description automatically generated">
-            <a:extLst>
-              <a:ext uri="{FF2B5EF4-FFF2-40B4-BE49-F238E27FC236}">
-                <a16:creationId xmlns:a16="http://schemas.microsoft.com/office/drawing/2014/main" id="{60D54EB0-F183-4046-810A-E4EEAEBD2598}"/>
+          <p:cNvPr id="10" name="Picture 9" descr="A picture containing text, map&#10;&#10;Description automatically generated">
+            <a:extLst>
+              <a:ext uri="{FF2B5EF4-FFF2-40B4-BE49-F238E27FC236}">
+                <a16:creationId xmlns:a16="http://schemas.microsoft.com/office/drawing/2014/main" id="{775ABB51-7757-46AB-B475-C12C81A6D786}"/>
               </a:ext>
             </a:extLst>
           </p:cNvPr>
@@ -7611,7 +6400,7 @@
           <p:nvPr/>
         </p:nvPicPr>
         <p:blipFill>
-          <a:blip r:embed="rId2">
+          <a:blip r:embed="rId2" cstate="print">
             <a:extLst>
               <a:ext uri="{28A0092B-C50C-407E-A947-70E740481C1C}">
                 <a14:useLocalDpi xmlns:a14="http://schemas.microsoft.com/office/drawing/2010/main" val="0"/>
@@ -7624,18 +6413,129 @@
         </p:blipFill>
         <p:spPr>
           <a:xfrm>
-            <a:off x="414976" y="1321899"/>
-            <a:ext cx="11362047" cy="4214201"/>
+            <a:off x="6137838" y="2517056"/>
+            <a:ext cx="5736485" cy="2202907"/>
           </a:xfrm>
           <a:prstGeom prst="rect">
             <a:avLst/>
           </a:prstGeom>
         </p:spPr>
       </p:pic>
+      <p:pic>
+        <p:nvPicPr>
+          <p:cNvPr id="12" name="Picture 11" descr="A picture containing text, map&#10;&#10;Description automatically generated">
+            <a:extLst>
+              <a:ext uri="{FF2B5EF4-FFF2-40B4-BE49-F238E27FC236}">
+                <a16:creationId xmlns:a16="http://schemas.microsoft.com/office/drawing/2014/main" id="{CDCA9856-469E-411E-83EC-BCF528E52763}"/>
+              </a:ext>
+            </a:extLst>
+          </p:cNvPr>
+          <p:cNvPicPr>
+            <a:picLocks noChangeAspect="1"/>
+          </p:cNvPicPr>
+          <p:nvPr/>
+        </p:nvPicPr>
+        <p:blipFill>
+          <a:blip r:embed="rId3" cstate="print">
+            <a:extLst>
+              <a:ext uri="{28A0092B-C50C-407E-A947-70E740481C1C}">
+                <a14:useLocalDpi xmlns:a14="http://schemas.microsoft.com/office/drawing/2010/main" val="0"/>
+              </a:ext>
+            </a:extLst>
+          </a:blip>
+          <a:stretch>
+            <a:fillRect/>
+          </a:stretch>
+        </p:blipFill>
+        <p:spPr>
+          <a:xfrm>
+            <a:off x="275839" y="2517056"/>
+            <a:ext cx="5736485" cy="2202907"/>
+          </a:xfrm>
+          <a:prstGeom prst="rect">
+            <a:avLst/>
+          </a:prstGeom>
+        </p:spPr>
+      </p:pic>
+      <p:sp>
+        <p:nvSpPr>
+          <p:cNvPr id="15" name="Rectangle 14">
+            <a:extLst>
+              <a:ext uri="{FF2B5EF4-FFF2-40B4-BE49-F238E27FC236}">
+                <a16:creationId xmlns:a16="http://schemas.microsoft.com/office/drawing/2014/main" id="{BC8C093D-2DB1-4221-BAEE-CF46598B6074}"/>
+              </a:ext>
+            </a:extLst>
+          </p:cNvPr>
+          <p:cNvSpPr/>
+          <p:nvPr/>
+        </p:nvSpPr>
+        <p:spPr>
+          <a:xfrm>
+            <a:off x="7027205" y="1735388"/>
+            <a:ext cx="3957750" cy="369332"/>
+          </a:xfrm>
+          <a:prstGeom prst="rect">
+            <a:avLst/>
+          </a:prstGeom>
+        </p:spPr>
+        <p:txBody>
+          <a:bodyPr wrap="none">
+            <a:spAutoFit/>
+          </a:bodyPr>
+          <a:lstStyle/>
+          <a:p>
+            <a:r>
+              <a:rPr lang="en-US" b="1"/>
+              <a:t>subRegShape = metis::mapGCAMReg32</a:t>
+            </a:r>
+          </a:p>
+        </p:txBody>
+      </p:sp>
+      <p:sp>
+        <p:nvSpPr>
+          <p:cNvPr id="16" name="Rectangle 15">
+            <a:extLst>
+              <a:ext uri="{FF2B5EF4-FFF2-40B4-BE49-F238E27FC236}">
+                <a16:creationId xmlns:a16="http://schemas.microsoft.com/office/drawing/2014/main" id="{0D814111-FBE8-4A7A-A869-B7599C55186F}"/>
+              </a:ext>
+            </a:extLst>
+          </p:cNvPr>
+          <p:cNvSpPr/>
+          <p:nvPr/>
+        </p:nvSpPr>
+        <p:spPr>
+          <a:xfrm>
+            <a:off x="1759823" y="1735388"/>
+            <a:ext cx="2715615" cy="646331"/>
+          </a:xfrm>
+          <a:prstGeom prst="rect">
+            <a:avLst/>
+          </a:prstGeom>
+        </p:spPr>
+        <p:txBody>
+          <a:bodyPr wrap="none">
+            <a:spAutoFit/>
+          </a:bodyPr>
+          <a:lstStyle/>
+          <a:p>
+            <a:r>
+              <a:rPr lang="en-US" b="1"/>
+              <a:t>subRegShape not assigned</a:t>
+            </a:r>
+          </a:p>
+          <a:p>
+            <a:pPr algn="ctr"/>
+            <a:r>
+              <a:rPr lang="en-US" b="1"/>
+              <a:t>auto selects a map</a:t>
+            </a:r>
+          </a:p>
+        </p:txBody>
+      </p:sp>
     </p:spTree>
     <p:extLst>
       <p:ext uri="{BB962C8B-B14F-4D97-AF65-F5344CB8AC3E}">
-        <p14:creationId xmlns:p14="http://schemas.microsoft.com/office/powerpoint/2010/main" val="636132822"/>
+        <p14:creationId xmlns:p14="http://schemas.microsoft.com/office/powerpoint/2010/main" val="1122343259"/>
       </p:ext>
     </p:extLst>
   </p:cSld>
@@ -8052,8 +6952,8 @@
         </p:nvSpPr>
         <p:spPr>
           <a:xfrm>
-            <a:off x="2360042" y="886004"/>
-            <a:ext cx="2066223" cy="369332"/>
+            <a:off x="1903717" y="886004"/>
+            <a:ext cx="2978874" cy="369332"/>
           </a:xfrm>
           <a:prstGeom prst="rect">
             <a:avLst/>
@@ -8069,7 +6969,7 @@
             <a:pPr algn="ctr"/>
             <a:r>
               <a:rPr lang="en-US" b="1"/>
-              <a:t>cropToBoundary=F</a:t>
+              <a:t>cropToBoundary=F (Default)</a:t>
             </a:r>
           </a:p>
         </p:txBody>
@@ -8154,8 +7054,8 @@
         </p:nvSpPr>
         <p:spPr>
           <a:xfrm>
-            <a:off x="192163" y="579074"/>
-            <a:ext cx="11807674" cy="5168363"/>
+            <a:off x="192163" y="1092200"/>
+            <a:ext cx="11807674" cy="4055533"/>
           </a:xfrm>
           <a:prstGeom prst="rect">
             <a:avLst/>
@@ -8258,8 +7158,8 @@
         </p:blipFill>
         <p:spPr>
           <a:xfrm>
-            <a:off x="571326" y="1682346"/>
-            <a:ext cx="4933661" cy="3660121"/>
+            <a:off x="274993" y="1937266"/>
+            <a:ext cx="3795672" cy="2815884"/>
           </a:xfrm>
           <a:prstGeom prst="rect">
             <a:avLst/>
@@ -8280,7 +7180,7 @@
         </p:nvSpPr>
         <p:spPr>
           <a:xfrm>
-            <a:off x="2004441" y="1110563"/>
+            <a:off x="1139717" y="1296659"/>
             <a:ext cx="2066223" cy="369332"/>
           </a:xfrm>
           <a:prstGeom prst="rect">
@@ -8316,7 +7216,7 @@
         </p:nvSpPr>
         <p:spPr>
           <a:xfrm>
-            <a:off x="8256488" y="1110563"/>
+            <a:off x="5062888" y="1296659"/>
             <a:ext cx="2066223" cy="369332"/>
           </a:xfrm>
           <a:prstGeom prst="rect">
@@ -8366,14 +7266,93 @@
         </p:blipFill>
         <p:spPr>
           <a:xfrm>
-            <a:off x="6824688" y="1682346"/>
-            <a:ext cx="4929825" cy="3727854"/>
+            <a:off x="4328616" y="1937266"/>
+            <a:ext cx="3792721" cy="2867994"/>
           </a:xfrm>
           <a:prstGeom prst="rect">
             <a:avLst/>
           </a:prstGeom>
         </p:spPr>
       </p:pic>
+      <p:pic>
+        <p:nvPicPr>
+          <p:cNvPr id="9" name="Picture 8" descr="A close up of a map&#10;&#10;Description automatically generated">
+            <a:extLst>
+              <a:ext uri="{FF2B5EF4-FFF2-40B4-BE49-F238E27FC236}">
+                <a16:creationId xmlns:a16="http://schemas.microsoft.com/office/drawing/2014/main" id="{EF254A4F-AC22-4ABF-B7F3-DFB688D1AC55}"/>
+              </a:ext>
+            </a:extLst>
+          </p:cNvPr>
+          <p:cNvPicPr>
+            <a:picLocks noChangeAspect="1"/>
+          </p:cNvPicPr>
+          <p:nvPr/>
+        </p:nvPicPr>
+        <p:blipFill>
+          <a:blip r:embed="rId4" cstate="print">
+            <a:extLst>
+              <a:ext uri="{28A0092B-C50C-407E-A947-70E740481C1C}">
+                <a14:useLocalDpi xmlns:a14="http://schemas.microsoft.com/office/drawing/2010/main" val="0"/>
+              </a:ext>
+            </a:extLst>
+          </a:blip>
+          <a:stretch>
+            <a:fillRect/>
+          </a:stretch>
+        </p:blipFill>
+        <p:spPr>
+          <a:xfrm>
+            <a:off x="8164226" y="1911211"/>
+            <a:ext cx="3792721" cy="2867994"/>
+          </a:xfrm>
+          <a:prstGeom prst="rect">
+            <a:avLst/>
+          </a:prstGeom>
+        </p:spPr>
+      </p:pic>
+      <p:sp>
+        <p:nvSpPr>
+          <p:cNvPr id="10" name="TextBox 9">
+            <a:extLst>
+              <a:ext uri="{FF2B5EF4-FFF2-40B4-BE49-F238E27FC236}">
+                <a16:creationId xmlns:a16="http://schemas.microsoft.com/office/drawing/2014/main" id="{B39AD5D9-2D14-4FE5-95BE-5BE80A869576}"/>
+              </a:ext>
+            </a:extLst>
+          </p:cNvPr>
+          <p:cNvSpPr txBox="1"/>
+          <p:nvPr/>
+        </p:nvSpPr>
+        <p:spPr>
+          <a:xfrm>
+            <a:off x="8754354" y="1158159"/>
+            <a:ext cx="2066223" cy="646331"/>
+          </a:xfrm>
+          <a:prstGeom prst="rect">
+            <a:avLst/>
+          </a:prstGeom>
+          <a:noFill/>
+        </p:spPr>
+        <p:txBody>
+          <a:bodyPr wrap="square" rtlCol="0">
+            <a:spAutoFit/>
+          </a:bodyPr>
+          <a:lstStyle/>
+          <a:p>
+            <a:pPr algn="ctr"/>
+            <a:r>
+              <a:rPr lang="en-US" b="1"/>
+              <a:t>extension = T</a:t>
+            </a:r>
+          </a:p>
+          <a:p>
+            <a:pPr algn="ctr"/>
+            <a:r>
+              <a:rPr lang="en-US" b="1"/>
+              <a:t>expandPercent = 50</a:t>
+            </a:r>
+          </a:p>
+        </p:txBody>
+      </p:sp>
     </p:spTree>
     <p:extLst>
       <p:ext uri="{BB962C8B-B14F-4D97-AF65-F5344CB8AC3E}">
@@ -9792,7 +8771,7 @@
               <a:pPr algn="ctr"/>
               <a:r>
                 <a:rPr lang="en-US"/>
-                <a:t>countries</a:t>
+                <a:t>country</a:t>
               </a:r>
             </a:p>
           </p:txBody>
@@ -10753,6 +9732,1491 @@
 </p:sld>
 </file>
 
+<file path=ppt/slides/slide29.xml><?xml version="1.0" encoding="utf-8"?>
+<p:sld xmlns:a="http://schemas.openxmlformats.org/drawingml/2006/main" xmlns:r="http://schemas.openxmlformats.org/officeDocument/2006/relationships" xmlns:p="http://schemas.openxmlformats.org/presentationml/2006/main">
+  <p:cSld>
+    <p:spTree>
+      <p:nvGrpSpPr>
+        <p:cNvPr id="1" name=""/>
+        <p:cNvGrpSpPr/>
+        <p:nvPr/>
+      </p:nvGrpSpPr>
+      <p:grpSpPr>
+        <a:xfrm>
+          <a:off x="0" y="0"/>
+          <a:ext cx="0" cy="0"/>
+          <a:chOff x="0" y="0"/>
+          <a:chExt cx="0" cy="0"/>
+        </a:xfrm>
+      </p:grpSpPr>
+      <p:sp>
+        <p:nvSpPr>
+          <p:cNvPr id="7" name="TextBox 6">
+            <a:extLst>
+              <a:ext uri="{FF2B5EF4-FFF2-40B4-BE49-F238E27FC236}">
+                <a16:creationId xmlns:a16="http://schemas.microsoft.com/office/drawing/2014/main" id="{A063DF1C-7DF0-40B4-AC9D-EC918B0CB000}"/>
+              </a:ext>
+            </a:extLst>
+          </p:cNvPr>
+          <p:cNvSpPr txBox="1"/>
+          <p:nvPr/>
+        </p:nvSpPr>
+        <p:spPr>
+          <a:xfrm>
+            <a:off x="192163" y="128664"/>
+            <a:ext cx="3101370" cy="369332"/>
+          </a:xfrm>
+          <a:prstGeom prst="rect">
+            <a:avLst/>
+          </a:prstGeom>
+          <a:noFill/>
+        </p:spPr>
+        <p:txBody>
+          <a:bodyPr wrap="square" rtlCol="0">
+            <a:spAutoFit/>
+          </a:bodyPr>
+          <a:lstStyle/>
+          <a:p>
+            <a:pPr algn="ctr"/>
+            <a:r>
+              <a:rPr lang="en-US" b="1"/>
+              <a:t>GCAM Results Folder</a:t>
+            </a:r>
+          </a:p>
+        </p:txBody>
+      </p:sp>
+      <p:grpSp>
+        <p:nvGrpSpPr>
+          <p:cNvPr id="12" name="Group 11">
+            <a:extLst>
+              <a:ext uri="{FF2B5EF4-FFF2-40B4-BE49-F238E27FC236}">
+                <a16:creationId xmlns:a16="http://schemas.microsoft.com/office/drawing/2014/main" id="{BAB3D5B8-F101-4F2A-BB68-D105EE67A66B}"/>
+              </a:ext>
+            </a:extLst>
+          </p:cNvPr>
+          <p:cNvGrpSpPr/>
+          <p:nvPr/>
+        </p:nvGrpSpPr>
+        <p:grpSpPr>
+          <a:xfrm>
+            <a:off x="1707202" y="1558164"/>
+            <a:ext cx="2066223" cy="965296"/>
+            <a:chOff x="1811039" y="1300849"/>
+            <a:chExt cx="2066223" cy="965296"/>
+          </a:xfrm>
+        </p:grpSpPr>
+        <p:pic>
+          <p:nvPicPr>
+            <p:cNvPr id="13" name="Picture 2">
+              <a:extLst>
+                <a:ext uri="{FF2B5EF4-FFF2-40B4-BE49-F238E27FC236}">
+                  <a16:creationId xmlns:a16="http://schemas.microsoft.com/office/drawing/2014/main" id="{6A6B1FFF-5D22-44C4-B7E8-B969938A312E}"/>
+                </a:ext>
+              </a:extLst>
+            </p:cNvPr>
+            <p:cNvPicPr>
+              <a:picLocks noChangeAspect="1" noChangeArrowheads="1"/>
+            </p:cNvPicPr>
+            <p:nvPr/>
+          </p:nvPicPr>
+          <p:blipFill>
+            <a:blip r:embed="rId2" cstate="print">
+              <a:extLst>
+                <a:ext uri="{28A0092B-C50C-407E-A947-70E740481C1C}">
+                  <a14:useLocalDpi xmlns:a14="http://schemas.microsoft.com/office/drawing/2010/main" val="0"/>
+                </a:ext>
+              </a:extLst>
+            </a:blip>
+            <a:srcRect/>
+            <a:stretch>
+              <a:fillRect/>
+            </a:stretch>
+          </p:blipFill>
+          <p:spPr bwMode="auto">
+            <a:xfrm>
+              <a:off x="2512807" y="1603456"/>
+              <a:ext cx="662689" cy="662689"/>
+            </a:xfrm>
+            <a:prstGeom prst="rect">
+              <a:avLst/>
+            </a:prstGeom>
+            <a:noFill/>
+            <a:extLst>
+              <a:ext uri="{909E8E84-426E-40DD-AFC4-6F175D3DCCD1}">
+                <a14:hiddenFill xmlns:a14="http://schemas.microsoft.com/office/drawing/2010/main">
+                  <a:solidFill>
+                    <a:srgbClr val="FFFFFF"/>
+                  </a:solidFill>
+                </a14:hiddenFill>
+              </a:ext>
+            </a:extLst>
+          </p:spPr>
+        </p:pic>
+        <p:sp>
+          <p:nvSpPr>
+            <p:cNvPr id="14" name="TextBox 13">
+              <a:extLst>
+                <a:ext uri="{FF2B5EF4-FFF2-40B4-BE49-F238E27FC236}">
+                  <a16:creationId xmlns:a16="http://schemas.microsoft.com/office/drawing/2014/main" id="{BE03BC9B-F13A-4CF5-B65E-F5BB04F3FFC3}"/>
+                </a:ext>
+              </a:extLst>
+            </p:cNvPr>
+            <p:cNvSpPr txBox="1"/>
+            <p:nvPr/>
+          </p:nvSpPr>
+          <p:spPr>
+            <a:xfrm>
+              <a:off x="1811039" y="1300849"/>
+              <a:ext cx="2066223" cy="369332"/>
+            </a:xfrm>
+            <a:prstGeom prst="rect">
+              <a:avLst/>
+            </a:prstGeom>
+            <a:noFill/>
+          </p:spPr>
+          <p:txBody>
+            <a:bodyPr wrap="square" rtlCol="0">
+              <a:spAutoFit/>
+            </a:bodyPr>
+            <a:lstStyle/>
+            <a:p>
+              <a:pPr algn="ctr"/>
+              <a:r>
+                <a:rPr lang="en-US"/>
+                <a:t>outputs</a:t>
+              </a:r>
+            </a:p>
+          </p:txBody>
+        </p:sp>
+      </p:grpSp>
+      <p:grpSp>
+        <p:nvGrpSpPr>
+          <p:cNvPr id="27" name="Group 26">
+            <a:extLst>
+              <a:ext uri="{FF2B5EF4-FFF2-40B4-BE49-F238E27FC236}">
+                <a16:creationId xmlns:a16="http://schemas.microsoft.com/office/drawing/2014/main" id="{C021E8F4-2180-4BA0-B64B-B4A111C6FDBA}"/>
+              </a:ext>
+            </a:extLst>
+          </p:cNvPr>
+          <p:cNvGrpSpPr/>
+          <p:nvPr/>
+        </p:nvGrpSpPr>
+        <p:grpSpPr>
+          <a:xfrm>
+            <a:off x="4904956" y="1563134"/>
+            <a:ext cx="2066223" cy="965296"/>
+            <a:chOff x="1811039" y="1300849"/>
+            <a:chExt cx="2066223" cy="965296"/>
+          </a:xfrm>
+        </p:grpSpPr>
+        <p:pic>
+          <p:nvPicPr>
+            <p:cNvPr id="28" name="Picture 2">
+              <a:extLst>
+                <a:ext uri="{FF2B5EF4-FFF2-40B4-BE49-F238E27FC236}">
+                  <a16:creationId xmlns:a16="http://schemas.microsoft.com/office/drawing/2014/main" id="{2FB42ADA-F0B4-4C57-823E-A9385F11E60E}"/>
+                </a:ext>
+              </a:extLst>
+            </p:cNvPr>
+            <p:cNvPicPr>
+              <a:picLocks noChangeAspect="1" noChangeArrowheads="1"/>
+            </p:cNvPicPr>
+            <p:nvPr/>
+          </p:nvPicPr>
+          <p:blipFill>
+            <a:blip r:embed="rId2" cstate="print">
+              <a:extLst>
+                <a:ext uri="{28A0092B-C50C-407E-A947-70E740481C1C}">
+                  <a14:useLocalDpi xmlns:a14="http://schemas.microsoft.com/office/drawing/2010/main" val="0"/>
+                </a:ext>
+              </a:extLst>
+            </a:blip>
+            <a:srcRect/>
+            <a:stretch>
+              <a:fillRect/>
+            </a:stretch>
+          </p:blipFill>
+          <p:spPr bwMode="auto">
+            <a:xfrm>
+              <a:off x="2512807" y="1603456"/>
+              <a:ext cx="662689" cy="662689"/>
+            </a:xfrm>
+            <a:prstGeom prst="rect">
+              <a:avLst/>
+            </a:prstGeom>
+            <a:noFill/>
+            <a:extLst>
+              <a:ext uri="{909E8E84-426E-40DD-AFC4-6F175D3DCCD1}">
+                <a14:hiddenFill xmlns:a14="http://schemas.microsoft.com/office/drawing/2010/main">
+                  <a:solidFill>
+                    <a:srgbClr val="FFFFFF"/>
+                  </a:solidFill>
+                </a14:hiddenFill>
+              </a:ext>
+            </a:extLst>
+          </p:spPr>
+        </p:pic>
+        <p:sp>
+          <p:nvSpPr>
+            <p:cNvPr id="29" name="TextBox 28">
+              <a:extLst>
+                <a:ext uri="{FF2B5EF4-FFF2-40B4-BE49-F238E27FC236}">
+                  <a16:creationId xmlns:a16="http://schemas.microsoft.com/office/drawing/2014/main" id="{C3FAE1FE-8437-4630-8945-A21EA82C2AD8}"/>
+                </a:ext>
+              </a:extLst>
+            </p:cNvPr>
+            <p:cNvSpPr txBox="1"/>
+            <p:nvPr/>
+          </p:nvSpPr>
+          <p:spPr>
+            <a:xfrm>
+              <a:off x="1811039" y="1300849"/>
+              <a:ext cx="2066223" cy="369332"/>
+            </a:xfrm>
+            <a:prstGeom prst="rect">
+              <a:avLst/>
+            </a:prstGeom>
+            <a:noFill/>
+          </p:spPr>
+          <p:txBody>
+            <a:bodyPr wrap="square" rtlCol="0">
+              <a:spAutoFit/>
+            </a:bodyPr>
+            <a:lstStyle/>
+            <a:p>
+              <a:pPr algn="ctr"/>
+              <a:r>
+                <a:rPr lang="en-US"/>
+                <a:t>Maps</a:t>
+              </a:r>
+            </a:p>
+          </p:txBody>
+        </p:sp>
+      </p:grpSp>
+      <p:cxnSp>
+        <p:nvCxnSpPr>
+          <p:cNvPr id="34" name="Straight Connector 33">
+            <a:extLst>
+              <a:ext uri="{FF2B5EF4-FFF2-40B4-BE49-F238E27FC236}">
+                <a16:creationId xmlns:a16="http://schemas.microsoft.com/office/drawing/2014/main" id="{72F8E274-F940-47BB-A66B-BFC930922115}"/>
+              </a:ext>
+            </a:extLst>
+          </p:cNvPr>
+          <p:cNvCxnSpPr>
+            <a:cxnSpLocks/>
+          </p:cNvCxnSpPr>
+          <p:nvPr/>
+        </p:nvCxnSpPr>
+        <p:spPr>
+          <a:xfrm>
+            <a:off x="6332043" y="2183327"/>
+            <a:ext cx="329272" cy="0"/>
+          </a:xfrm>
+          <a:prstGeom prst="line">
+            <a:avLst/>
+          </a:prstGeom>
+          <a:ln>
+            <a:tailEnd type="triangle" w="lg" len="lg"/>
+          </a:ln>
+        </p:spPr>
+        <p:style>
+          <a:lnRef idx="1">
+            <a:schemeClr val="dk1"/>
+          </a:lnRef>
+          <a:fillRef idx="0">
+            <a:schemeClr val="dk1"/>
+          </a:fillRef>
+          <a:effectRef idx="0">
+            <a:schemeClr val="dk1"/>
+          </a:effectRef>
+          <a:fontRef idx="minor">
+            <a:schemeClr val="tx1"/>
+          </a:fontRef>
+        </p:style>
+      </p:cxnSp>
+      <p:cxnSp>
+        <p:nvCxnSpPr>
+          <p:cNvPr id="35" name="Straight Connector 34">
+            <a:extLst>
+              <a:ext uri="{FF2B5EF4-FFF2-40B4-BE49-F238E27FC236}">
+                <a16:creationId xmlns:a16="http://schemas.microsoft.com/office/drawing/2014/main" id="{2D1AD679-BAA7-43F2-BBF0-AEC4E9355207}"/>
+              </a:ext>
+            </a:extLst>
+          </p:cNvPr>
+          <p:cNvCxnSpPr>
+            <a:cxnSpLocks/>
+          </p:cNvCxnSpPr>
+          <p:nvPr/>
+        </p:nvCxnSpPr>
+        <p:spPr>
+          <a:xfrm>
+            <a:off x="3114302" y="2208726"/>
+            <a:ext cx="329272" cy="0"/>
+          </a:xfrm>
+          <a:prstGeom prst="line">
+            <a:avLst/>
+          </a:prstGeom>
+          <a:ln>
+            <a:tailEnd type="triangle" w="lg" len="lg"/>
+          </a:ln>
+        </p:spPr>
+        <p:style>
+          <a:lnRef idx="1">
+            <a:schemeClr val="dk1"/>
+          </a:lnRef>
+          <a:fillRef idx="0">
+            <a:schemeClr val="dk1"/>
+          </a:fillRef>
+          <a:effectRef idx="0">
+            <a:schemeClr val="dk1"/>
+          </a:effectRef>
+          <a:fontRef idx="minor">
+            <a:schemeClr val="tx1"/>
+          </a:fontRef>
+        </p:style>
+      </p:cxnSp>
+      <p:sp>
+        <p:nvSpPr>
+          <p:cNvPr id="39" name="Rectangle 38">
+            <a:extLst>
+              <a:ext uri="{FF2B5EF4-FFF2-40B4-BE49-F238E27FC236}">
+                <a16:creationId xmlns:a16="http://schemas.microsoft.com/office/drawing/2014/main" id="{1FEBA126-27DE-47AE-968F-0A03BC9B58B9}"/>
+              </a:ext>
+            </a:extLst>
+          </p:cNvPr>
+          <p:cNvSpPr/>
+          <p:nvPr/>
+        </p:nvSpPr>
+        <p:spPr>
+          <a:xfrm>
+            <a:off x="4147676" y="2771590"/>
+            <a:ext cx="319668" cy="211816"/>
+          </a:xfrm>
+          <a:prstGeom prst="rect">
+            <a:avLst/>
+          </a:prstGeom>
+          <a:noFill/>
+          <a:ln>
+            <a:noFill/>
+          </a:ln>
+        </p:spPr>
+        <p:style>
+          <a:lnRef idx="2">
+            <a:schemeClr val="accent1">
+              <a:shade val="50000"/>
+            </a:schemeClr>
+          </a:lnRef>
+          <a:fillRef idx="1">
+            <a:schemeClr val="accent1"/>
+          </a:fillRef>
+          <a:effectRef idx="0">
+            <a:schemeClr val="accent1"/>
+          </a:effectRef>
+          <a:fontRef idx="minor">
+            <a:schemeClr val="lt1"/>
+          </a:fontRef>
+        </p:style>
+        <p:txBody>
+          <a:bodyPr rtlCol="0" anchor="ctr"/>
+          <a:lstStyle/>
+          <a:p>
+            <a:pPr algn="ctr"/>
+            <a:endParaRPr lang="en-US"/>
+          </a:p>
+        </p:txBody>
+      </p:sp>
+      <p:sp>
+        <p:nvSpPr>
+          <p:cNvPr id="40" name="Rectangle 39">
+            <a:extLst>
+              <a:ext uri="{FF2B5EF4-FFF2-40B4-BE49-F238E27FC236}">
+                <a16:creationId xmlns:a16="http://schemas.microsoft.com/office/drawing/2014/main" id="{48B99608-FE84-4406-99AA-EAF2D7969384}"/>
+              </a:ext>
+            </a:extLst>
+          </p:cNvPr>
+          <p:cNvSpPr/>
+          <p:nvPr/>
+        </p:nvSpPr>
+        <p:spPr>
+          <a:xfrm>
+            <a:off x="4121494" y="3024011"/>
+            <a:ext cx="319668" cy="211816"/>
+          </a:xfrm>
+          <a:prstGeom prst="rect">
+            <a:avLst/>
+          </a:prstGeom>
+          <a:noFill/>
+          <a:ln>
+            <a:noFill/>
+          </a:ln>
+        </p:spPr>
+        <p:style>
+          <a:lnRef idx="2">
+            <a:schemeClr val="accent1">
+              <a:shade val="50000"/>
+            </a:schemeClr>
+          </a:lnRef>
+          <a:fillRef idx="1">
+            <a:schemeClr val="accent1"/>
+          </a:fillRef>
+          <a:effectRef idx="0">
+            <a:schemeClr val="accent1"/>
+          </a:effectRef>
+          <a:fontRef idx="minor">
+            <a:schemeClr val="lt1"/>
+          </a:fontRef>
+        </p:style>
+        <p:txBody>
+          <a:bodyPr rtlCol="0" anchor="ctr"/>
+          <a:lstStyle/>
+          <a:p>
+            <a:pPr algn="ctr"/>
+            <a:endParaRPr lang="en-US"/>
+          </a:p>
+        </p:txBody>
+      </p:sp>
+      <p:sp>
+        <p:nvSpPr>
+          <p:cNvPr id="41" name="TextBox 40">
+            <a:extLst>
+              <a:ext uri="{FF2B5EF4-FFF2-40B4-BE49-F238E27FC236}">
+                <a16:creationId xmlns:a16="http://schemas.microsoft.com/office/drawing/2014/main" id="{1779615A-615E-4B19-919C-26C953E6E68C}"/>
+              </a:ext>
+            </a:extLst>
+          </p:cNvPr>
+          <p:cNvSpPr txBox="1"/>
+          <p:nvPr/>
+        </p:nvSpPr>
+        <p:spPr>
+          <a:xfrm>
+            <a:off x="674620" y="1977441"/>
+            <a:ext cx="2066223" cy="369332"/>
+          </a:xfrm>
+          <a:prstGeom prst="rect">
+            <a:avLst/>
+          </a:prstGeom>
+          <a:noFill/>
+        </p:spPr>
+        <p:txBody>
+          <a:bodyPr wrap="square" rtlCol="0">
+            <a:spAutoFit/>
+          </a:bodyPr>
+          <a:lstStyle/>
+          <a:p>
+            <a:pPr algn="ctr"/>
+            <a:r>
+              <a:rPr lang="en-US"/>
+              <a:t>Working Dir: </a:t>
+            </a:r>
+          </a:p>
+        </p:txBody>
+      </p:sp>
+      <p:sp>
+        <p:nvSpPr>
+          <p:cNvPr id="42" name="Rectangle 41">
+            <a:extLst>
+              <a:ext uri="{FF2B5EF4-FFF2-40B4-BE49-F238E27FC236}">
+                <a16:creationId xmlns:a16="http://schemas.microsoft.com/office/drawing/2014/main" id="{6CF596FB-C3D1-4A12-97A0-6930D20FD8C7}"/>
+              </a:ext>
+            </a:extLst>
+          </p:cNvPr>
+          <p:cNvSpPr/>
+          <p:nvPr/>
+        </p:nvSpPr>
+        <p:spPr>
+          <a:xfrm>
+            <a:off x="873016" y="609600"/>
+            <a:ext cx="11014183" cy="5759837"/>
+          </a:xfrm>
+          <a:prstGeom prst="rect">
+            <a:avLst/>
+          </a:prstGeom>
+          <a:noFill/>
+          <a:ln>
+            <a:solidFill>
+              <a:schemeClr val="bg1">
+                <a:lumMod val="65000"/>
+              </a:schemeClr>
+            </a:solidFill>
+          </a:ln>
+        </p:spPr>
+        <p:style>
+          <a:lnRef idx="2">
+            <a:schemeClr val="accent1">
+              <a:shade val="50000"/>
+            </a:schemeClr>
+          </a:lnRef>
+          <a:fillRef idx="1">
+            <a:schemeClr val="accent1"/>
+          </a:fillRef>
+          <a:effectRef idx="0">
+            <a:schemeClr val="accent1"/>
+          </a:effectRef>
+          <a:fontRef idx="minor">
+            <a:schemeClr val="lt1"/>
+          </a:fontRef>
+        </p:style>
+        <p:txBody>
+          <a:bodyPr rtlCol="0" anchor="ctr"/>
+          <a:lstStyle/>
+          <a:p>
+            <a:pPr algn="ctr"/>
+            <a:endParaRPr lang="en-US"/>
+          </a:p>
+        </p:txBody>
+      </p:sp>
+      <p:grpSp>
+        <p:nvGrpSpPr>
+          <p:cNvPr id="4" name="Group 3">
+            <a:extLst>
+              <a:ext uri="{FF2B5EF4-FFF2-40B4-BE49-F238E27FC236}">
+                <a16:creationId xmlns:a16="http://schemas.microsoft.com/office/drawing/2014/main" id="{4C23FD75-E3CD-476E-90A9-5E46DB529E60}"/>
+              </a:ext>
+            </a:extLst>
+          </p:cNvPr>
+          <p:cNvGrpSpPr/>
+          <p:nvPr/>
+        </p:nvGrpSpPr>
+        <p:grpSpPr>
+          <a:xfrm>
+            <a:off x="9066957" y="1632743"/>
+            <a:ext cx="2190959" cy="1192711"/>
+            <a:chOff x="7654084" y="1134688"/>
+            <a:chExt cx="2190959" cy="1192711"/>
+          </a:xfrm>
+        </p:grpSpPr>
+        <p:pic>
+          <p:nvPicPr>
+            <p:cNvPr id="2" name="Picture 1">
+              <a:extLst>
+                <a:ext uri="{FF2B5EF4-FFF2-40B4-BE49-F238E27FC236}">
+                  <a16:creationId xmlns:a16="http://schemas.microsoft.com/office/drawing/2014/main" id="{C5E334A7-89BE-4361-A189-A761FBDB5719}"/>
+                </a:ext>
+              </a:extLst>
+            </p:cNvPr>
+            <p:cNvPicPr>
+              <a:picLocks noChangeAspect="1"/>
+            </p:cNvPicPr>
+            <p:nvPr/>
+          </p:nvPicPr>
+          <p:blipFill>
+            <a:blip r:embed="rId3"/>
+            <a:stretch>
+              <a:fillRect/>
+            </a:stretch>
+          </p:blipFill>
+          <p:spPr>
+            <a:xfrm>
+              <a:off x="7654085" y="1134688"/>
+              <a:ext cx="2190958" cy="1192711"/>
+            </a:xfrm>
+            <a:prstGeom prst="rect">
+              <a:avLst/>
+            </a:prstGeom>
+          </p:spPr>
+        </p:pic>
+        <p:sp>
+          <p:nvSpPr>
+            <p:cNvPr id="43" name="Rectangle 42">
+              <a:extLst>
+                <a:ext uri="{FF2B5EF4-FFF2-40B4-BE49-F238E27FC236}">
+                  <a16:creationId xmlns:a16="http://schemas.microsoft.com/office/drawing/2014/main" id="{0D8BAA3A-4632-4772-9C3C-C37B50C98DC0}"/>
+                </a:ext>
+              </a:extLst>
+            </p:cNvPr>
+            <p:cNvSpPr/>
+            <p:nvPr/>
+          </p:nvSpPr>
+          <p:spPr>
+            <a:xfrm>
+              <a:off x="7654084" y="1135413"/>
+              <a:ext cx="1881747" cy="1108253"/>
+            </a:xfrm>
+            <a:prstGeom prst="rect">
+              <a:avLst/>
+            </a:prstGeom>
+            <a:noFill/>
+            <a:ln>
+              <a:solidFill>
+                <a:schemeClr val="bg1">
+                  <a:lumMod val="65000"/>
+                </a:schemeClr>
+              </a:solidFill>
+            </a:ln>
+          </p:spPr>
+          <p:style>
+            <a:lnRef idx="2">
+              <a:schemeClr val="accent1">
+                <a:shade val="50000"/>
+              </a:schemeClr>
+            </a:lnRef>
+            <a:fillRef idx="1">
+              <a:schemeClr val="accent1"/>
+            </a:fillRef>
+            <a:effectRef idx="0">
+              <a:schemeClr val="accent1"/>
+            </a:effectRef>
+            <a:fontRef idx="minor">
+              <a:schemeClr val="lt1"/>
+            </a:fontRef>
+          </p:style>
+          <p:txBody>
+            <a:bodyPr rtlCol="0" anchor="ctr"/>
+            <a:lstStyle/>
+            <a:p>
+              <a:pPr algn="ctr"/>
+              <a:endParaRPr lang="en-US"/>
+            </a:p>
+          </p:txBody>
+        </p:sp>
+      </p:grpSp>
+      <p:sp>
+        <p:nvSpPr>
+          <p:cNvPr id="45" name="TextBox 44">
+            <a:extLst>
+              <a:ext uri="{FF2B5EF4-FFF2-40B4-BE49-F238E27FC236}">
+                <a16:creationId xmlns:a16="http://schemas.microsoft.com/office/drawing/2014/main" id="{E0961D01-4B41-4085-A98E-30C59C8E00BE}"/>
+              </a:ext>
+            </a:extLst>
+          </p:cNvPr>
+          <p:cNvSpPr txBox="1"/>
+          <p:nvPr/>
+        </p:nvSpPr>
+        <p:spPr>
+          <a:xfrm>
+            <a:off x="8899033" y="1275572"/>
+            <a:ext cx="2066223" cy="369332"/>
+          </a:xfrm>
+          <a:prstGeom prst="rect">
+            <a:avLst/>
+          </a:prstGeom>
+          <a:noFill/>
+        </p:spPr>
+        <p:txBody>
+          <a:bodyPr wrap="square" rtlCol="0">
+            <a:spAutoFit/>
+          </a:bodyPr>
+          <a:lstStyle/>
+          <a:p>
+            <a:pPr algn="ctr"/>
+            <a:r>
+              <a:rPr lang="en-US">
+                <a:solidFill>
+                  <a:srgbClr val="C00000"/>
+                </a:solidFill>
+              </a:rPr>
+              <a:t>params</a:t>
+            </a:r>
+          </a:p>
+        </p:txBody>
+      </p:sp>
+      <p:grpSp>
+        <p:nvGrpSpPr>
+          <p:cNvPr id="50" name="Group 49">
+            <a:extLst>
+              <a:ext uri="{FF2B5EF4-FFF2-40B4-BE49-F238E27FC236}">
+                <a16:creationId xmlns:a16="http://schemas.microsoft.com/office/drawing/2014/main" id="{DE7EB3C8-874D-4E66-9700-B3AB1E71B526}"/>
+              </a:ext>
+            </a:extLst>
+          </p:cNvPr>
+          <p:cNvGrpSpPr/>
+          <p:nvPr/>
+        </p:nvGrpSpPr>
+        <p:grpSpPr>
+          <a:xfrm>
+            <a:off x="5938067" y="3122478"/>
+            <a:ext cx="3954072" cy="3143174"/>
+            <a:chOff x="4441162" y="2732004"/>
+            <a:chExt cx="3954072" cy="3143174"/>
+          </a:xfrm>
+        </p:grpSpPr>
+        <p:pic>
+          <p:nvPicPr>
+            <p:cNvPr id="3" name="Picture 2">
+              <a:extLst>
+                <a:ext uri="{FF2B5EF4-FFF2-40B4-BE49-F238E27FC236}">
+                  <a16:creationId xmlns:a16="http://schemas.microsoft.com/office/drawing/2014/main" id="{54EFBEFC-ECE1-4D56-A393-99B7D0603135}"/>
+                </a:ext>
+              </a:extLst>
+            </p:cNvPr>
+            <p:cNvPicPr>
+              <a:picLocks noChangeAspect="1"/>
+            </p:cNvPicPr>
+            <p:nvPr/>
+          </p:nvPicPr>
+          <p:blipFill>
+            <a:blip r:embed="rId4"/>
+            <a:stretch>
+              <a:fillRect/>
+            </a:stretch>
+          </p:blipFill>
+          <p:spPr>
+            <a:xfrm>
+              <a:off x="4467344" y="3131752"/>
+              <a:ext cx="3927890" cy="2743426"/>
+            </a:xfrm>
+            <a:prstGeom prst="rect">
+              <a:avLst/>
+            </a:prstGeom>
+          </p:spPr>
+        </p:pic>
+        <p:sp>
+          <p:nvSpPr>
+            <p:cNvPr id="44" name="Rectangle 43">
+              <a:extLst>
+                <a:ext uri="{FF2B5EF4-FFF2-40B4-BE49-F238E27FC236}">
+                  <a16:creationId xmlns:a16="http://schemas.microsoft.com/office/drawing/2014/main" id="{F40D5D0A-B1DA-4172-9B75-AEBC33C51687}"/>
+                </a:ext>
+              </a:extLst>
+            </p:cNvPr>
+            <p:cNvSpPr/>
+            <p:nvPr/>
+          </p:nvSpPr>
+          <p:spPr>
+            <a:xfrm>
+              <a:off x="4441162" y="3064705"/>
+              <a:ext cx="3927890" cy="2743424"/>
+            </a:xfrm>
+            <a:prstGeom prst="rect">
+              <a:avLst/>
+            </a:prstGeom>
+            <a:noFill/>
+            <a:ln>
+              <a:solidFill>
+                <a:schemeClr val="bg1">
+                  <a:lumMod val="65000"/>
+                </a:schemeClr>
+              </a:solidFill>
+            </a:ln>
+          </p:spPr>
+          <p:style>
+            <a:lnRef idx="2">
+              <a:schemeClr val="accent1">
+                <a:shade val="50000"/>
+              </a:schemeClr>
+            </a:lnRef>
+            <a:fillRef idx="1">
+              <a:schemeClr val="accent1"/>
+            </a:fillRef>
+            <a:effectRef idx="0">
+              <a:schemeClr val="accent1"/>
+            </a:effectRef>
+            <a:fontRef idx="minor">
+              <a:schemeClr val="lt1"/>
+            </a:fontRef>
+          </p:style>
+          <p:txBody>
+            <a:bodyPr rtlCol="0" anchor="ctr"/>
+            <a:lstStyle/>
+            <a:p>
+              <a:pPr algn="ctr"/>
+              <a:endParaRPr lang="en-US"/>
+            </a:p>
+          </p:txBody>
+        </p:sp>
+        <p:sp>
+          <p:nvSpPr>
+            <p:cNvPr id="46" name="TextBox 45">
+              <a:extLst>
+                <a:ext uri="{FF2B5EF4-FFF2-40B4-BE49-F238E27FC236}">
+                  <a16:creationId xmlns:a16="http://schemas.microsoft.com/office/drawing/2014/main" id="{A9340060-A35D-4ACF-ACA4-D5DD7267A633}"/>
+                </a:ext>
+              </a:extLst>
+            </p:cNvPr>
+            <p:cNvSpPr txBox="1"/>
+            <p:nvPr/>
+          </p:nvSpPr>
+          <p:spPr>
+            <a:xfrm>
+              <a:off x="4835612" y="2732004"/>
+              <a:ext cx="3187616" cy="369332"/>
+            </a:xfrm>
+            <a:prstGeom prst="rect">
+              <a:avLst/>
+            </a:prstGeom>
+            <a:noFill/>
+          </p:spPr>
+          <p:txBody>
+            <a:bodyPr wrap="square" rtlCol="0">
+              <a:spAutoFit/>
+            </a:bodyPr>
+            <a:lstStyle/>
+            <a:p>
+              <a:pPr algn="ctr"/>
+              <a:r>
+                <a:rPr lang="en-US">
+                  <a:solidFill>
+                    <a:srgbClr val="C00000"/>
+                  </a:solidFill>
+                </a:rPr>
+                <a:t>Animation, Mean and by Year</a:t>
+              </a:r>
+            </a:p>
+          </p:txBody>
+        </p:sp>
+      </p:grpSp>
+      <p:grpSp>
+        <p:nvGrpSpPr>
+          <p:cNvPr id="51" name="Group 50">
+            <a:extLst>
+              <a:ext uri="{FF2B5EF4-FFF2-40B4-BE49-F238E27FC236}">
+                <a16:creationId xmlns:a16="http://schemas.microsoft.com/office/drawing/2014/main" id="{C0A6B757-DE8E-45DA-B8B2-2044B06A306E}"/>
+              </a:ext>
+            </a:extLst>
+          </p:cNvPr>
+          <p:cNvGrpSpPr/>
+          <p:nvPr/>
+        </p:nvGrpSpPr>
+        <p:grpSpPr>
+          <a:xfrm>
+            <a:off x="2103063" y="3815567"/>
+            <a:ext cx="2204447" cy="1799201"/>
+            <a:chOff x="1555904" y="3302331"/>
+            <a:chExt cx="2204447" cy="1799201"/>
+          </a:xfrm>
+        </p:grpSpPr>
+        <p:pic>
+          <p:nvPicPr>
+            <p:cNvPr id="47" name="Picture 46">
+              <a:extLst>
+                <a:ext uri="{FF2B5EF4-FFF2-40B4-BE49-F238E27FC236}">
+                  <a16:creationId xmlns:a16="http://schemas.microsoft.com/office/drawing/2014/main" id="{175DCC27-09C9-4911-89D5-5D6E61FEE6EF}"/>
+                </a:ext>
+              </a:extLst>
+            </p:cNvPr>
+            <p:cNvPicPr>
+              <a:picLocks noChangeAspect="1"/>
+            </p:cNvPicPr>
+            <p:nvPr/>
+          </p:nvPicPr>
+          <p:blipFill>
+            <a:blip r:embed="rId5"/>
+            <a:stretch>
+              <a:fillRect/>
+            </a:stretch>
+          </p:blipFill>
+          <p:spPr>
+            <a:xfrm>
+              <a:off x="1598083" y="3643823"/>
+              <a:ext cx="2162268" cy="1457709"/>
+            </a:xfrm>
+            <a:prstGeom prst="rect">
+              <a:avLst/>
+            </a:prstGeom>
+          </p:spPr>
+        </p:pic>
+        <p:sp>
+          <p:nvSpPr>
+            <p:cNvPr id="48" name="Rectangle 47">
+              <a:extLst>
+                <a:ext uri="{FF2B5EF4-FFF2-40B4-BE49-F238E27FC236}">
+                  <a16:creationId xmlns:a16="http://schemas.microsoft.com/office/drawing/2014/main" id="{7CE5152F-C392-4081-B31E-646BCF77F85B}"/>
+                </a:ext>
+              </a:extLst>
+            </p:cNvPr>
+            <p:cNvSpPr/>
+            <p:nvPr/>
+          </p:nvSpPr>
+          <p:spPr>
+            <a:xfrm>
+              <a:off x="1555904" y="3643822"/>
+              <a:ext cx="2162268" cy="1457710"/>
+            </a:xfrm>
+            <a:prstGeom prst="rect">
+              <a:avLst/>
+            </a:prstGeom>
+            <a:noFill/>
+            <a:ln>
+              <a:solidFill>
+                <a:schemeClr val="bg1">
+                  <a:lumMod val="65000"/>
+                </a:schemeClr>
+              </a:solidFill>
+            </a:ln>
+          </p:spPr>
+          <p:style>
+            <a:lnRef idx="2">
+              <a:schemeClr val="accent1">
+                <a:shade val="50000"/>
+              </a:schemeClr>
+            </a:lnRef>
+            <a:fillRef idx="1">
+              <a:schemeClr val="accent1"/>
+            </a:fillRef>
+            <a:effectRef idx="0">
+              <a:schemeClr val="accent1"/>
+            </a:effectRef>
+            <a:fontRef idx="minor">
+              <a:schemeClr val="lt1"/>
+            </a:fontRef>
+          </p:style>
+          <p:txBody>
+            <a:bodyPr rtlCol="0" anchor="ctr"/>
+            <a:lstStyle/>
+            <a:p>
+              <a:pPr algn="ctr"/>
+              <a:endParaRPr lang="en-US"/>
+            </a:p>
+          </p:txBody>
+        </p:sp>
+        <p:sp>
+          <p:nvSpPr>
+            <p:cNvPr id="49" name="TextBox 48">
+              <a:extLst>
+                <a:ext uri="{FF2B5EF4-FFF2-40B4-BE49-F238E27FC236}">
+                  <a16:creationId xmlns:a16="http://schemas.microsoft.com/office/drawing/2014/main" id="{03C6CADE-0C94-455F-8D95-D49EA5D79CAB}"/>
+                </a:ext>
+              </a:extLst>
+            </p:cNvPr>
+            <p:cNvSpPr txBox="1"/>
+            <p:nvPr/>
+          </p:nvSpPr>
+          <p:spPr>
+            <a:xfrm>
+              <a:off x="1571901" y="3302331"/>
+              <a:ext cx="2066223" cy="369332"/>
+            </a:xfrm>
+            <a:prstGeom prst="rect">
+              <a:avLst/>
+            </a:prstGeom>
+            <a:noFill/>
+          </p:spPr>
+          <p:txBody>
+            <a:bodyPr wrap="square" rtlCol="0">
+              <a:spAutoFit/>
+            </a:bodyPr>
+            <a:lstStyle/>
+            <a:p>
+              <a:pPr algn="ctr"/>
+              <a:r>
+                <a:rPr lang="en-US">
+                  <a:solidFill>
+                    <a:srgbClr val="C00000"/>
+                  </a:solidFill>
+                </a:rPr>
+                <a:t>Scenarios</a:t>
+              </a:r>
+            </a:p>
+          </p:txBody>
+        </p:sp>
+      </p:grpSp>
+      <p:cxnSp>
+        <p:nvCxnSpPr>
+          <p:cNvPr id="52" name="Connector: Elbow 51">
+            <a:extLst>
+              <a:ext uri="{FF2B5EF4-FFF2-40B4-BE49-F238E27FC236}">
+                <a16:creationId xmlns:a16="http://schemas.microsoft.com/office/drawing/2014/main" id="{AE3C862C-39AE-49EC-9182-6FC1210D812C}"/>
+              </a:ext>
+            </a:extLst>
+          </p:cNvPr>
+          <p:cNvCxnSpPr>
+            <a:cxnSpLocks/>
+            <a:stCxn id="2" idx="2"/>
+            <a:endCxn id="49" idx="0"/>
+          </p:cNvCxnSpPr>
+          <p:nvPr/>
+        </p:nvCxnSpPr>
+        <p:spPr>
+          <a:xfrm rot="5400000">
+            <a:off x="6162249" y="-184622"/>
+            <a:ext cx="990113" cy="7010265"/>
+          </a:xfrm>
+          <a:prstGeom prst="bentConnector3">
+            <a:avLst>
+              <a:gd name="adj1" fmla="val 17230"/>
+            </a:avLst>
+          </a:prstGeom>
+          <a:ln>
+            <a:tailEnd type="triangle" w="lg" len="lg"/>
+          </a:ln>
+        </p:spPr>
+        <p:style>
+          <a:lnRef idx="1">
+            <a:schemeClr val="dk1"/>
+          </a:lnRef>
+          <a:fillRef idx="0">
+            <a:schemeClr val="dk1"/>
+          </a:fillRef>
+          <a:effectRef idx="0">
+            <a:schemeClr val="dk1"/>
+          </a:effectRef>
+          <a:fontRef idx="minor">
+            <a:schemeClr val="tx1"/>
+          </a:fontRef>
+        </p:style>
+      </p:cxnSp>
+      <p:cxnSp>
+        <p:nvCxnSpPr>
+          <p:cNvPr id="57" name="Straight Connector 56">
+            <a:extLst>
+              <a:ext uri="{FF2B5EF4-FFF2-40B4-BE49-F238E27FC236}">
+                <a16:creationId xmlns:a16="http://schemas.microsoft.com/office/drawing/2014/main" id="{A3C9FE4D-4D72-4CE7-9AAD-67C5D147C575}"/>
+              </a:ext>
+            </a:extLst>
+          </p:cNvPr>
+          <p:cNvCxnSpPr>
+            <a:cxnSpLocks/>
+            <a:stCxn id="47" idx="3"/>
+            <a:endCxn id="3" idx="1"/>
+          </p:cNvCxnSpPr>
+          <p:nvPr/>
+        </p:nvCxnSpPr>
+        <p:spPr>
+          <a:xfrm>
+            <a:off x="4307510" y="4885914"/>
+            <a:ext cx="1656739" cy="8025"/>
+          </a:xfrm>
+          <a:prstGeom prst="line">
+            <a:avLst/>
+          </a:prstGeom>
+          <a:ln>
+            <a:tailEnd type="triangle" w="lg" len="lg"/>
+          </a:ln>
+        </p:spPr>
+        <p:style>
+          <a:lnRef idx="1">
+            <a:schemeClr val="dk1"/>
+          </a:lnRef>
+          <a:fillRef idx="0">
+            <a:schemeClr val="dk1"/>
+          </a:fillRef>
+          <a:effectRef idx="0">
+            <a:schemeClr val="dk1"/>
+          </a:effectRef>
+          <a:fontRef idx="minor">
+            <a:schemeClr val="tx1"/>
+          </a:fontRef>
+        </p:style>
+      </p:cxnSp>
+      <p:grpSp>
+        <p:nvGrpSpPr>
+          <p:cNvPr id="6" name="Group 5">
+            <a:extLst>
+              <a:ext uri="{FF2B5EF4-FFF2-40B4-BE49-F238E27FC236}">
+                <a16:creationId xmlns:a16="http://schemas.microsoft.com/office/drawing/2014/main" id="{CF3F9385-005B-463F-A553-3023EA895F3C}"/>
+              </a:ext>
+            </a:extLst>
+          </p:cNvPr>
+          <p:cNvGrpSpPr/>
+          <p:nvPr/>
+        </p:nvGrpSpPr>
+        <p:grpSpPr>
+          <a:xfrm>
+            <a:off x="6598670" y="1428901"/>
+            <a:ext cx="2066223" cy="1224361"/>
+            <a:chOff x="6598670" y="1428901"/>
+            <a:chExt cx="2066223" cy="1224361"/>
+          </a:xfrm>
+        </p:grpSpPr>
+        <p:pic>
+          <p:nvPicPr>
+            <p:cNvPr id="5" name="Picture 4">
+              <a:extLst>
+                <a:ext uri="{FF2B5EF4-FFF2-40B4-BE49-F238E27FC236}">
+                  <a16:creationId xmlns:a16="http://schemas.microsoft.com/office/drawing/2014/main" id="{72581B72-2F69-45F8-8953-C82F782E9EFF}"/>
+                </a:ext>
+              </a:extLst>
+            </p:cNvPr>
+            <p:cNvPicPr>
+              <a:picLocks noChangeAspect="1"/>
+            </p:cNvPicPr>
+            <p:nvPr/>
+          </p:nvPicPr>
+          <p:blipFill>
+            <a:blip r:embed="rId6"/>
+            <a:stretch>
+              <a:fillRect/>
+            </a:stretch>
+          </p:blipFill>
+          <p:spPr>
+            <a:xfrm>
+              <a:off x="6859711" y="1881966"/>
+              <a:ext cx="1601517" cy="740095"/>
+            </a:xfrm>
+            <a:prstGeom prst="rect">
+              <a:avLst/>
+            </a:prstGeom>
+          </p:spPr>
+        </p:pic>
+        <p:sp>
+          <p:nvSpPr>
+            <p:cNvPr id="64" name="Rectangle 63">
+              <a:extLst>
+                <a:ext uri="{FF2B5EF4-FFF2-40B4-BE49-F238E27FC236}">
+                  <a16:creationId xmlns:a16="http://schemas.microsoft.com/office/drawing/2014/main" id="{7C6293DD-4921-436F-B347-57A1BD241D4F}"/>
+                </a:ext>
+              </a:extLst>
+            </p:cNvPr>
+            <p:cNvSpPr/>
+            <p:nvPr/>
+          </p:nvSpPr>
+          <p:spPr>
+            <a:xfrm>
+              <a:off x="6813940" y="1808787"/>
+              <a:ext cx="1635681" cy="844475"/>
+            </a:xfrm>
+            <a:prstGeom prst="rect">
+              <a:avLst/>
+            </a:prstGeom>
+            <a:noFill/>
+            <a:ln>
+              <a:solidFill>
+                <a:schemeClr val="bg1">
+                  <a:lumMod val="65000"/>
+                </a:schemeClr>
+              </a:solidFill>
+            </a:ln>
+          </p:spPr>
+          <p:style>
+            <a:lnRef idx="2">
+              <a:schemeClr val="accent1">
+                <a:shade val="50000"/>
+              </a:schemeClr>
+            </a:lnRef>
+            <a:fillRef idx="1">
+              <a:schemeClr val="accent1"/>
+            </a:fillRef>
+            <a:effectRef idx="0">
+              <a:schemeClr val="accent1"/>
+            </a:effectRef>
+            <a:fontRef idx="minor">
+              <a:schemeClr val="lt1"/>
+            </a:fontRef>
+          </p:style>
+          <p:txBody>
+            <a:bodyPr rtlCol="0" anchor="ctr"/>
+            <a:lstStyle/>
+            <a:p>
+              <a:pPr algn="ctr"/>
+              <a:endParaRPr lang="en-US"/>
+            </a:p>
+          </p:txBody>
+        </p:sp>
+        <p:sp>
+          <p:nvSpPr>
+            <p:cNvPr id="66" name="TextBox 65">
+              <a:extLst>
+                <a:ext uri="{FF2B5EF4-FFF2-40B4-BE49-F238E27FC236}">
+                  <a16:creationId xmlns:a16="http://schemas.microsoft.com/office/drawing/2014/main" id="{E717E439-AE87-400F-A3B2-2B2F8B3EE115}"/>
+                </a:ext>
+              </a:extLst>
+            </p:cNvPr>
+            <p:cNvSpPr txBox="1"/>
+            <p:nvPr/>
+          </p:nvSpPr>
+          <p:spPr>
+            <a:xfrm>
+              <a:off x="6598670" y="1428901"/>
+              <a:ext cx="2066223" cy="369332"/>
+            </a:xfrm>
+            <a:prstGeom prst="rect">
+              <a:avLst/>
+            </a:prstGeom>
+            <a:noFill/>
+          </p:spPr>
+          <p:txBody>
+            <a:bodyPr wrap="square" rtlCol="0">
+              <a:spAutoFit/>
+            </a:bodyPr>
+            <a:lstStyle/>
+            <a:p>
+              <a:pPr algn="ctr"/>
+              <a:r>
+                <a:rPr lang="en-US">
+                  <a:solidFill>
+                    <a:srgbClr val="C00000"/>
+                  </a:solidFill>
+                </a:rPr>
+                <a:t>subRegType</a:t>
+              </a:r>
+            </a:p>
+          </p:txBody>
+        </p:sp>
+      </p:grpSp>
+      <p:grpSp>
+        <p:nvGrpSpPr>
+          <p:cNvPr id="71" name="Group 70">
+            <a:extLst>
+              <a:ext uri="{FF2B5EF4-FFF2-40B4-BE49-F238E27FC236}">
+                <a16:creationId xmlns:a16="http://schemas.microsoft.com/office/drawing/2014/main" id="{D60EF237-31C2-427F-A5EA-98A6DB95781B}"/>
+              </a:ext>
+            </a:extLst>
+          </p:cNvPr>
+          <p:cNvGrpSpPr/>
+          <p:nvPr/>
+        </p:nvGrpSpPr>
+        <p:grpSpPr>
+          <a:xfrm>
+            <a:off x="3527112" y="1733645"/>
+            <a:ext cx="1789880" cy="856923"/>
+            <a:chOff x="3840043" y="914304"/>
+            <a:chExt cx="1789880" cy="856923"/>
+          </a:xfrm>
+        </p:grpSpPr>
+        <p:pic>
+          <p:nvPicPr>
+            <p:cNvPr id="69" name="Picture 68">
+              <a:extLst>
+                <a:ext uri="{FF2B5EF4-FFF2-40B4-BE49-F238E27FC236}">
+                  <a16:creationId xmlns:a16="http://schemas.microsoft.com/office/drawing/2014/main" id="{07A67591-E3A2-487E-87A7-6C5269EFEC81}"/>
+                </a:ext>
+              </a:extLst>
+            </p:cNvPr>
+            <p:cNvPicPr>
+              <a:picLocks noChangeAspect="1"/>
+            </p:cNvPicPr>
+            <p:nvPr/>
+          </p:nvPicPr>
+          <p:blipFill>
+            <a:blip r:embed="rId7"/>
+            <a:stretch>
+              <a:fillRect/>
+            </a:stretch>
+          </p:blipFill>
+          <p:spPr>
+            <a:xfrm>
+              <a:off x="3875890" y="914304"/>
+              <a:ext cx="1754033" cy="762097"/>
+            </a:xfrm>
+            <a:prstGeom prst="rect">
+              <a:avLst/>
+            </a:prstGeom>
+          </p:spPr>
+        </p:pic>
+        <p:sp>
+          <p:nvSpPr>
+            <p:cNvPr id="70" name="Rectangle 69">
+              <a:extLst>
+                <a:ext uri="{FF2B5EF4-FFF2-40B4-BE49-F238E27FC236}">
+                  <a16:creationId xmlns:a16="http://schemas.microsoft.com/office/drawing/2014/main" id="{58A89826-8D49-4D1C-9FDC-93E626B53D30}"/>
+                </a:ext>
+              </a:extLst>
+            </p:cNvPr>
+            <p:cNvSpPr/>
+            <p:nvPr/>
+          </p:nvSpPr>
+          <p:spPr>
+            <a:xfrm>
+              <a:off x="3840043" y="926752"/>
+              <a:ext cx="1635681" cy="844475"/>
+            </a:xfrm>
+            <a:prstGeom prst="rect">
+              <a:avLst/>
+            </a:prstGeom>
+            <a:noFill/>
+            <a:ln>
+              <a:solidFill>
+                <a:schemeClr val="bg1">
+                  <a:lumMod val="65000"/>
+                </a:schemeClr>
+              </a:solidFill>
+            </a:ln>
+          </p:spPr>
+          <p:style>
+            <a:lnRef idx="2">
+              <a:schemeClr val="accent1">
+                <a:shade val="50000"/>
+              </a:schemeClr>
+            </a:lnRef>
+            <a:fillRef idx="1">
+              <a:schemeClr val="accent1"/>
+            </a:fillRef>
+            <a:effectRef idx="0">
+              <a:schemeClr val="accent1"/>
+            </a:effectRef>
+            <a:fontRef idx="minor">
+              <a:schemeClr val="lt1"/>
+            </a:fontRef>
+          </p:style>
+          <p:txBody>
+            <a:bodyPr rtlCol="0" anchor="ctr"/>
+            <a:lstStyle/>
+            <a:p>
+              <a:pPr algn="ctr"/>
+              <a:endParaRPr lang="en-US"/>
+            </a:p>
+          </p:txBody>
+        </p:sp>
+      </p:grpSp>
+      <p:sp>
+        <p:nvSpPr>
+          <p:cNvPr id="72" name="TextBox 71">
+            <a:extLst>
+              <a:ext uri="{FF2B5EF4-FFF2-40B4-BE49-F238E27FC236}">
+                <a16:creationId xmlns:a16="http://schemas.microsoft.com/office/drawing/2014/main" id="{5B54B477-7F5C-4DE5-BAFF-A473BEBCD651}"/>
+              </a:ext>
+            </a:extLst>
+          </p:cNvPr>
+          <p:cNvSpPr txBox="1"/>
+          <p:nvPr/>
+        </p:nvSpPr>
+        <p:spPr>
+          <a:xfrm>
+            <a:off x="3278938" y="1412147"/>
+            <a:ext cx="2066223" cy="369332"/>
+          </a:xfrm>
+          <a:prstGeom prst="rect">
+            <a:avLst/>
+          </a:prstGeom>
+          <a:noFill/>
+        </p:spPr>
+        <p:txBody>
+          <a:bodyPr wrap="square" rtlCol="0">
+            <a:spAutoFit/>
+          </a:bodyPr>
+          <a:lstStyle/>
+          <a:p>
+            <a:pPr algn="ctr"/>
+            <a:r>
+              <a:rPr lang="en-US">
+                <a:solidFill>
+                  <a:srgbClr val="C00000"/>
+                </a:solidFill>
+              </a:rPr>
+              <a:t>folderName</a:t>
+            </a:r>
+          </a:p>
+        </p:txBody>
+      </p:sp>
+      <p:cxnSp>
+        <p:nvCxnSpPr>
+          <p:cNvPr id="74" name="Straight Connector 73">
+            <a:extLst>
+              <a:ext uri="{FF2B5EF4-FFF2-40B4-BE49-F238E27FC236}">
+                <a16:creationId xmlns:a16="http://schemas.microsoft.com/office/drawing/2014/main" id="{8602651A-7B76-4745-8B1F-59A7486B9C69}"/>
+              </a:ext>
+            </a:extLst>
+          </p:cNvPr>
+          <p:cNvCxnSpPr>
+            <a:cxnSpLocks/>
+          </p:cNvCxnSpPr>
+          <p:nvPr/>
+        </p:nvCxnSpPr>
+        <p:spPr>
+          <a:xfrm>
+            <a:off x="5273048" y="2197085"/>
+            <a:ext cx="329272" cy="0"/>
+          </a:xfrm>
+          <a:prstGeom prst="line">
+            <a:avLst/>
+          </a:prstGeom>
+          <a:ln>
+            <a:tailEnd type="triangle" w="lg" len="lg"/>
+          </a:ln>
+        </p:spPr>
+        <p:style>
+          <a:lnRef idx="1">
+            <a:schemeClr val="dk1"/>
+          </a:lnRef>
+          <a:fillRef idx="0">
+            <a:schemeClr val="dk1"/>
+          </a:fillRef>
+          <a:effectRef idx="0">
+            <a:schemeClr val="dk1"/>
+          </a:effectRef>
+          <a:fontRef idx="minor">
+            <a:schemeClr val="tx1"/>
+          </a:fontRef>
+        </p:style>
+      </p:cxnSp>
+      <p:cxnSp>
+        <p:nvCxnSpPr>
+          <p:cNvPr id="75" name="Straight Connector 74">
+            <a:extLst>
+              <a:ext uri="{FF2B5EF4-FFF2-40B4-BE49-F238E27FC236}">
+                <a16:creationId xmlns:a16="http://schemas.microsoft.com/office/drawing/2014/main" id="{0F682D75-FDC6-4E20-9F8B-ADFA453DC08E}"/>
+              </a:ext>
+            </a:extLst>
+          </p:cNvPr>
+          <p:cNvCxnSpPr>
+            <a:cxnSpLocks/>
+          </p:cNvCxnSpPr>
+          <p:nvPr/>
+        </p:nvCxnSpPr>
+        <p:spPr>
+          <a:xfrm>
+            <a:off x="8569761" y="2192115"/>
+            <a:ext cx="329272" cy="0"/>
+          </a:xfrm>
+          <a:prstGeom prst="line">
+            <a:avLst/>
+          </a:prstGeom>
+          <a:ln>
+            <a:tailEnd type="triangle" w="lg" len="lg"/>
+          </a:ln>
+        </p:spPr>
+        <p:style>
+          <a:lnRef idx="1">
+            <a:schemeClr val="dk1"/>
+          </a:lnRef>
+          <a:fillRef idx="0">
+            <a:schemeClr val="dk1"/>
+          </a:fillRef>
+          <a:effectRef idx="0">
+            <a:schemeClr val="dk1"/>
+          </a:effectRef>
+          <a:fontRef idx="minor">
+            <a:schemeClr val="tx1"/>
+          </a:fontRef>
+        </p:style>
+      </p:cxnSp>
+      <p:sp>
+        <p:nvSpPr>
+          <p:cNvPr id="78" name="TextBox 77">
+            <a:extLst>
+              <a:ext uri="{FF2B5EF4-FFF2-40B4-BE49-F238E27FC236}">
+                <a16:creationId xmlns:a16="http://schemas.microsoft.com/office/drawing/2014/main" id="{58DD7A67-DA53-4E27-850B-8B1000104609}"/>
+              </a:ext>
+            </a:extLst>
+          </p:cNvPr>
+          <p:cNvSpPr txBox="1"/>
+          <p:nvPr/>
+        </p:nvSpPr>
+        <p:spPr>
+          <a:xfrm>
+            <a:off x="2657321" y="716818"/>
+            <a:ext cx="8291383" cy="369332"/>
+          </a:xfrm>
+          <a:prstGeom prst="rect">
+            <a:avLst/>
+          </a:prstGeom>
+          <a:noFill/>
+        </p:spPr>
+        <p:txBody>
+          <a:bodyPr wrap="square" rtlCol="0">
+            <a:spAutoFit/>
+          </a:bodyPr>
+          <a:lstStyle/>
+          <a:p>
+            <a:pPr algn="ctr"/>
+            <a:r>
+              <a:rPr lang="en-US" b="1"/>
+              <a:t>Note: Folders created automatically for each unique </a:t>
+            </a:r>
+            <a:r>
+              <a:rPr lang="en-US">
+                <a:solidFill>
+                  <a:srgbClr val="C00000"/>
+                </a:solidFill>
+              </a:rPr>
+              <a:t>subRegType, param, scenario</a:t>
+            </a:r>
+          </a:p>
+        </p:txBody>
+      </p:sp>
+    </p:spTree>
+    <p:extLst>
+      <p:ext uri="{BB962C8B-B14F-4D97-AF65-F5344CB8AC3E}">
+        <p14:creationId xmlns:p14="http://schemas.microsoft.com/office/powerpoint/2010/main" val="1048377473"/>
+      </p:ext>
+    </p:extLst>
+  </p:cSld>
+  <p:clrMapOvr>
+    <a:masterClrMapping/>
+  </p:clrMapOvr>
+</p:sld>
+</file>
+
 <file path=ppt/slides/slide3.xml><?xml version="1.0" encoding="utf-8"?>
 <p:sld xmlns:a="http://schemas.openxmlformats.org/drawingml/2006/main" xmlns:r="http://schemas.openxmlformats.org/officeDocument/2006/relationships" xmlns:p="http://schemas.openxmlformats.org/presentationml/2006/main">
   <p:cSld>
@@ -11062,6 +11526,771 @@
     <p:extLst>
       <p:ext uri="{BB962C8B-B14F-4D97-AF65-F5344CB8AC3E}">
         <p14:creationId xmlns:p14="http://schemas.microsoft.com/office/powerpoint/2010/main" val="48681350"/>
+      </p:ext>
+    </p:extLst>
+  </p:cSld>
+  <p:clrMapOvr>
+    <a:masterClrMapping/>
+  </p:clrMapOvr>
+</p:sld>
+</file>
+
+<file path=ppt/slides/slide30.xml><?xml version="1.0" encoding="utf-8"?>
+<p:sld xmlns:a="http://schemas.openxmlformats.org/drawingml/2006/main" xmlns:r="http://schemas.openxmlformats.org/officeDocument/2006/relationships" xmlns:p="http://schemas.openxmlformats.org/presentationml/2006/main">
+  <p:cSld>
+    <p:spTree>
+      <p:nvGrpSpPr>
+        <p:cNvPr id="1" name=""/>
+        <p:cNvGrpSpPr/>
+        <p:nvPr/>
+      </p:nvGrpSpPr>
+      <p:grpSpPr>
+        <a:xfrm>
+          <a:off x="0" y="0"/>
+          <a:ext cx="0" cy="0"/>
+          <a:chOff x="0" y="0"/>
+          <a:chExt cx="0" cy="0"/>
+        </a:xfrm>
+      </p:grpSpPr>
+      <p:sp>
+        <p:nvSpPr>
+          <p:cNvPr id="7" name="TextBox 6">
+            <a:extLst>
+              <a:ext uri="{FF2B5EF4-FFF2-40B4-BE49-F238E27FC236}">
+                <a16:creationId xmlns:a16="http://schemas.microsoft.com/office/drawing/2014/main" id="{A063DF1C-7DF0-40B4-AC9D-EC918B0CB000}"/>
+              </a:ext>
+            </a:extLst>
+          </p:cNvPr>
+          <p:cNvSpPr txBox="1"/>
+          <p:nvPr/>
+        </p:nvSpPr>
+        <p:spPr>
+          <a:xfrm>
+            <a:off x="192162" y="-345805"/>
+            <a:ext cx="3101370" cy="369332"/>
+          </a:xfrm>
+          <a:prstGeom prst="rect">
+            <a:avLst/>
+          </a:prstGeom>
+          <a:noFill/>
+        </p:spPr>
+        <p:txBody>
+          <a:bodyPr wrap="square" rtlCol="0">
+            <a:spAutoFit/>
+          </a:bodyPr>
+          <a:lstStyle/>
+          <a:p>
+            <a:pPr algn="ctr"/>
+            <a:r>
+              <a:rPr lang="en-US" b="1"/>
+              <a:t>GCAM by Param Figs</a:t>
+            </a:r>
+          </a:p>
+        </p:txBody>
+      </p:sp>
+      <p:sp>
+        <p:nvSpPr>
+          <p:cNvPr id="3" name="Rectangle 2">
+            <a:extLst>
+              <a:ext uri="{FF2B5EF4-FFF2-40B4-BE49-F238E27FC236}">
+                <a16:creationId xmlns:a16="http://schemas.microsoft.com/office/drawing/2014/main" id="{F74BF3CB-7E52-4F13-8449-FE231ADB4921}"/>
+              </a:ext>
+            </a:extLst>
+          </p:cNvPr>
+          <p:cNvSpPr/>
+          <p:nvPr/>
+        </p:nvSpPr>
+        <p:spPr>
+          <a:xfrm>
+            <a:off x="442452" y="117988"/>
+            <a:ext cx="11444747" cy="6548284"/>
+          </a:xfrm>
+          <a:prstGeom prst="rect">
+            <a:avLst/>
+          </a:prstGeom>
+          <a:noFill/>
+          <a:ln>
+            <a:solidFill>
+              <a:schemeClr val="bg1">
+                <a:lumMod val="65000"/>
+              </a:schemeClr>
+            </a:solidFill>
+          </a:ln>
+        </p:spPr>
+        <p:style>
+          <a:lnRef idx="2">
+            <a:schemeClr val="accent1">
+              <a:shade val="50000"/>
+            </a:schemeClr>
+          </a:lnRef>
+          <a:fillRef idx="1">
+            <a:schemeClr val="accent1"/>
+          </a:fillRef>
+          <a:effectRef idx="0">
+            <a:schemeClr val="accent1"/>
+          </a:effectRef>
+          <a:fontRef idx="minor">
+            <a:schemeClr val="lt1"/>
+          </a:fontRef>
+        </p:style>
+        <p:txBody>
+          <a:bodyPr rtlCol="0" anchor="ctr"/>
+          <a:lstStyle/>
+          <a:p>
+            <a:pPr algn="ctr"/>
+            <a:endParaRPr lang="en-US"/>
+          </a:p>
+        </p:txBody>
+      </p:sp>
+      <p:sp>
+        <p:nvSpPr>
+          <p:cNvPr id="64" name="TextBox 63">
+            <a:extLst>
+              <a:ext uri="{FF2B5EF4-FFF2-40B4-BE49-F238E27FC236}">
+                <a16:creationId xmlns:a16="http://schemas.microsoft.com/office/drawing/2014/main" id="{7628F066-CA00-4417-A6D9-707233D718F1}"/>
+              </a:ext>
+            </a:extLst>
+          </p:cNvPr>
+          <p:cNvSpPr txBox="1"/>
+          <p:nvPr/>
+        </p:nvSpPr>
+        <p:spPr>
+          <a:xfrm>
+            <a:off x="1084319" y="741040"/>
+            <a:ext cx="2485538" cy="369332"/>
+          </a:xfrm>
+          <a:prstGeom prst="rect">
+            <a:avLst/>
+          </a:prstGeom>
+          <a:noFill/>
+        </p:spPr>
+        <p:txBody>
+          <a:bodyPr wrap="square" rtlCol="0">
+            <a:spAutoFit/>
+          </a:bodyPr>
+          <a:lstStyle/>
+          <a:p>
+            <a:pPr algn="ctr"/>
+            <a:r>
+              <a:rPr lang="en-US" b="1"/>
+              <a:t>Population by Year SSP3</a:t>
+            </a:r>
+          </a:p>
+        </p:txBody>
+      </p:sp>
+      <p:sp>
+        <p:nvSpPr>
+          <p:cNvPr id="65" name="TextBox 64">
+            <a:extLst>
+              <a:ext uri="{FF2B5EF4-FFF2-40B4-BE49-F238E27FC236}">
+                <a16:creationId xmlns:a16="http://schemas.microsoft.com/office/drawing/2014/main" id="{D00C1B6A-B22A-4D19-91EF-C8BA151777A4}"/>
+              </a:ext>
+            </a:extLst>
+          </p:cNvPr>
+          <p:cNvSpPr txBox="1"/>
+          <p:nvPr/>
+        </p:nvSpPr>
+        <p:spPr>
+          <a:xfrm>
+            <a:off x="807994" y="3486630"/>
+            <a:ext cx="2485538" cy="646331"/>
+          </a:xfrm>
+          <a:prstGeom prst="rect">
+            <a:avLst/>
+          </a:prstGeom>
+          <a:noFill/>
+        </p:spPr>
+        <p:txBody>
+          <a:bodyPr wrap="square" rtlCol="0">
+            <a:spAutoFit/>
+          </a:bodyPr>
+          <a:lstStyle/>
+          <a:p>
+            <a:pPr algn="ctr"/>
+            <a:r>
+              <a:rPr lang="en-US" b="1"/>
+              <a:t>Land Allocation SSP5</a:t>
+            </a:r>
+          </a:p>
+          <a:p>
+            <a:pPr algn="ctr"/>
+            <a:r>
+              <a:rPr lang="en-US" b="1"/>
+              <a:t>(Mean 2010 to 2050)</a:t>
+            </a:r>
+          </a:p>
+        </p:txBody>
+      </p:sp>
+      <p:sp>
+        <p:nvSpPr>
+          <p:cNvPr id="66" name="TextBox 65">
+            <a:extLst>
+              <a:ext uri="{FF2B5EF4-FFF2-40B4-BE49-F238E27FC236}">
+                <a16:creationId xmlns:a16="http://schemas.microsoft.com/office/drawing/2014/main" id="{D23BD46B-EFD3-48A8-A749-606D7DA6C469}"/>
+              </a:ext>
+            </a:extLst>
+          </p:cNvPr>
+          <p:cNvSpPr txBox="1"/>
+          <p:nvPr/>
+        </p:nvSpPr>
+        <p:spPr>
+          <a:xfrm>
+            <a:off x="4853231" y="3552051"/>
+            <a:ext cx="2485538" cy="369332"/>
+          </a:xfrm>
+          <a:prstGeom prst="rect">
+            <a:avLst/>
+          </a:prstGeom>
+          <a:noFill/>
+        </p:spPr>
+        <p:txBody>
+          <a:bodyPr wrap="square" rtlCol="0">
+            <a:spAutoFit/>
+          </a:bodyPr>
+          <a:lstStyle/>
+          <a:p>
+            <a:pPr algn="ctr"/>
+            <a:r>
+              <a:rPr lang="en-US" b="1"/>
+              <a:t>Runoff by Basin 2050</a:t>
+            </a:r>
+          </a:p>
+        </p:txBody>
+      </p:sp>
+      <p:sp>
+        <p:nvSpPr>
+          <p:cNvPr id="67" name="TextBox 66">
+            <a:extLst>
+              <a:ext uri="{FF2B5EF4-FFF2-40B4-BE49-F238E27FC236}">
+                <a16:creationId xmlns:a16="http://schemas.microsoft.com/office/drawing/2014/main" id="{80439EAE-3020-4A30-8A0D-8343E7A17CD8}"/>
+              </a:ext>
+            </a:extLst>
+          </p:cNvPr>
+          <p:cNvSpPr txBox="1"/>
+          <p:nvPr/>
+        </p:nvSpPr>
+        <p:spPr>
+          <a:xfrm>
+            <a:off x="8412211" y="3447289"/>
+            <a:ext cx="2950299" cy="646331"/>
+          </a:xfrm>
+          <a:prstGeom prst="rect">
+            <a:avLst/>
+          </a:prstGeom>
+          <a:noFill/>
+        </p:spPr>
+        <p:txBody>
+          <a:bodyPr wrap="square" rtlCol="0">
+            <a:spAutoFit/>
+          </a:bodyPr>
+          <a:lstStyle/>
+          <a:p>
+            <a:pPr algn="ctr"/>
+            <a:r>
+              <a:rPr lang="en-US" b="1"/>
+              <a:t>Percentage Diff Elec Gen</a:t>
+            </a:r>
+          </a:p>
+          <a:p>
+            <a:pPr algn="ctr"/>
+            <a:r>
+              <a:rPr lang="en-US" b="1"/>
+              <a:t>(SSP5 – SSP3)</a:t>
+            </a:r>
+          </a:p>
+        </p:txBody>
+      </p:sp>
+      <p:pic>
+        <p:nvPicPr>
+          <p:cNvPr id="6" name="Picture 5" descr="A picture containing text, map&#10;&#10;Description automatically generated">
+            <a:extLst>
+              <a:ext uri="{FF2B5EF4-FFF2-40B4-BE49-F238E27FC236}">
+                <a16:creationId xmlns:a16="http://schemas.microsoft.com/office/drawing/2014/main" id="{5246A03D-8991-4794-AFC7-9553B33AAC8B}"/>
+              </a:ext>
+            </a:extLst>
+          </p:cNvPr>
+          <p:cNvPicPr>
+            <a:picLocks noChangeAspect="1"/>
+          </p:cNvPicPr>
+          <p:nvPr/>
+        </p:nvPicPr>
+        <p:blipFill>
+          <a:blip r:embed="rId2" cstate="print">
+            <a:extLst>
+              <a:ext uri="{28A0092B-C50C-407E-A947-70E740481C1C}">
+                <a14:useLocalDpi xmlns:a14="http://schemas.microsoft.com/office/drawing/2010/main" val="0"/>
+              </a:ext>
+            </a:extLst>
+          </a:blip>
+          <a:stretch>
+            <a:fillRect/>
+          </a:stretch>
+        </p:blipFill>
+        <p:spPr>
+          <a:xfrm>
+            <a:off x="4568054" y="4106049"/>
+            <a:ext cx="3655891" cy="2472811"/>
+          </a:xfrm>
+          <a:prstGeom prst="rect">
+            <a:avLst/>
+          </a:prstGeom>
+        </p:spPr>
+      </p:pic>
+      <p:pic>
+        <p:nvPicPr>
+          <p:cNvPr id="17" name="Picture 16" descr="A picture containing text, map&#10;&#10;Description automatically generated">
+            <a:extLst>
+              <a:ext uri="{FF2B5EF4-FFF2-40B4-BE49-F238E27FC236}">
+                <a16:creationId xmlns:a16="http://schemas.microsoft.com/office/drawing/2014/main" id="{1CF5B8F5-FA65-42EB-B3F1-1C8421421835}"/>
+              </a:ext>
+            </a:extLst>
+          </p:cNvPr>
+          <p:cNvPicPr>
+            <a:picLocks noChangeAspect="1"/>
+          </p:cNvPicPr>
+          <p:nvPr/>
+        </p:nvPicPr>
+        <p:blipFill>
+          <a:blip r:embed="rId3" cstate="print">
+            <a:extLst>
+              <a:ext uri="{28A0092B-C50C-407E-A947-70E740481C1C}">
+                <a14:useLocalDpi xmlns:a14="http://schemas.microsoft.com/office/drawing/2010/main" val="0"/>
+              </a:ext>
+            </a:extLst>
+          </a:blip>
+          <a:stretch>
+            <a:fillRect/>
+          </a:stretch>
+        </p:blipFill>
+        <p:spPr>
+          <a:xfrm>
+            <a:off x="672542" y="4106049"/>
+            <a:ext cx="3717897" cy="2472811"/>
+          </a:xfrm>
+          <a:prstGeom prst="rect">
+            <a:avLst/>
+          </a:prstGeom>
+        </p:spPr>
+      </p:pic>
+      <p:pic>
+        <p:nvPicPr>
+          <p:cNvPr id="19" name="Picture 18" descr="A close up of a map&#10;&#10;Description automatically generated">
+            <a:extLst>
+              <a:ext uri="{FF2B5EF4-FFF2-40B4-BE49-F238E27FC236}">
+                <a16:creationId xmlns:a16="http://schemas.microsoft.com/office/drawing/2014/main" id="{0D9FB249-DA1F-47EC-A0F5-53F1A1704847}"/>
+              </a:ext>
+            </a:extLst>
+          </p:cNvPr>
+          <p:cNvPicPr>
+            <a:picLocks noChangeAspect="1"/>
+          </p:cNvPicPr>
+          <p:nvPr/>
+        </p:nvPicPr>
+        <p:blipFill>
+          <a:blip r:embed="rId4">
+            <a:extLst>
+              <a:ext uri="{28A0092B-C50C-407E-A947-70E740481C1C}">
+                <a14:useLocalDpi xmlns:a14="http://schemas.microsoft.com/office/drawing/2010/main" val="0"/>
+              </a:ext>
+            </a:extLst>
+          </a:blip>
+          <a:stretch>
+            <a:fillRect/>
+          </a:stretch>
+        </p:blipFill>
+        <p:spPr>
+          <a:xfrm>
+            <a:off x="3934490" y="221175"/>
+            <a:ext cx="7428020" cy="1409063"/>
+          </a:xfrm>
+          <a:prstGeom prst="rect">
+            <a:avLst/>
+          </a:prstGeom>
+        </p:spPr>
+      </p:pic>
+      <p:pic>
+        <p:nvPicPr>
+          <p:cNvPr id="21" name="Picture 20" descr="A picture containing text, map&#10;&#10;Description automatically generated">
+            <a:extLst>
+              <a:ext uri="{FF2B5EF4-FFF2-40B4-BE49-F238E27FC236}">
+                <a16:creationId xmlns:a16="http://schemas.microsoft.com/office/drawing/2014/main" id="{46679271-34BC-46F3-A89F-3DD2AA742315}"/>
+              </a:ext>
+            </a:extLst>
+          </p:cNvPr>
+          <p:cNvPicPr>
+            <a:picLocks noChangeAspect="1"/>
+          </p:cNvPicPr>
+          <p:nvPr/>
+        </p:nvPicPr>
+        <p:blipFill>
+          <a:blip r:embed="rId5">
+            <a:extLst>
+              <a:ext uri="{28A0092B-C50C-407E-A947-70E740481C1C}">
+                <a14:useLocalDpi xmlns:a14="http://schemas.microsoft.com/office/drawing/2010/main" val="0"/>
+              </a:ext>
+            </a:extLst>
+          </a:blip>
+          <a:stretch>
+            <a:fillRect/>
+          </a:stretch>
+        </p:blipFill>
+        <p:spPr>
+          <a:xfrm>
+            <a:off x="3934490" y="1828225"/>
+            <a:ext cx="7223619" cy="1409062"/>
+          </a:xfrm>
+          <a:prstGeom prst="rect">
+            <a:avLst/>
+          </a:prstGeom>
+        </p:spPr>
+      </p:pic>
+      <p:sp>
+        <p:nvSpPr>
+          <p:cNvPr id="30" name="TextBox 29">
+            <a:extLst>
+              <a:ext uri="{FF2B5EF4-FFF2-40B4-BE49-F238E27FC236}">
+                <a16:creationId xmlns:a16="http://schemas.microsoft.com/office/drawing/2014/main" id="{2DFD97C6-B7A5-4D16-B656-84935B142B4C}"/>
+              </a:ext>
+            </a:extLst>
+          </p:cNvPr>
+          <p:cNvSpPr txBox="1"/>
+          <p:nvPr/>
+        </p:nvSpPr>
+        <p:spPr>
+          <a:xfrm>
+            <a:off x="1084319" y="1981564"/>
+            <a:ext cx="2485538" cy="923330"/>
+          </a:xfrm>
+          <a:prstGeom prst="rect">
+            <a:avLst/>
+          </a:prstGeom>
+          <a:noFill/>
+        </p:spPr>
+        <p:txBody>
+          <a:bodyPr wrap="square" rtlCol="0">
+            <a:spAutoFit/>
+          </a:bodyPr>
+          <a:lstStyle/>
+          <a:p>
+            <a:pPr algn="ctr"/>
+            <a:r>
+              <a:rPr lang="en-US" b="1"/>
+              <a:t>Absolute Difference in Population by Year</a:t>
+            </a:r>
+          </a:p>
+          <a:p>
+            <a:pPr algn="ctr"/>
+            <a:r>
+              <a:rPr lang="en-US" b="1"/>
+              <a:t>(SSP5 – SSP3)</a:t>
+            </a:r>
+          </a:p>
+        </p:txBody>
+      </p:sp>
+      <p:pic>
+        <p:nvPicPr>
+          <p:cNvPr id="25" name="Picture 24" descr="A picture containing text, map&#10;&#10;Description automatically generated">
+            <a:extLst>
+              <a:ext uri="{FF2B5EF4-FFF2-40B4-BE49-F238E27FC236}">
+                <a16:creationId xmlns:a16="http://schemas.microsoft.com/office/drawing/2014/main" id="{1F8DE4E6-08A9-4594-88BA-0F93AA1C048E}"/>
+              </a:ext>
+            </a:extLst>
+          </p:cNvPr>
+          <p:cNvPicPr>
+            <a:picLocks noChangeAspect="1"/>
+          </p:cNvPicPr>
+          <p:nvPr/>
+        </p:nvPicPr>
+        <p:blipFill>
+          <a:blip r:embed="rId6" cstate="print">
+            <a:extLst>
+              <a:ext uri="{28A0092B-C50C-407E-A947-70E740481C1C}">
+                <a14:useLocalDpi xmlns:a14="http://schemas.microsoft.com/office/drawing/2010/main" val="0"/>
+              </a:ext>
+            </a:extLst>
+          </a:blip>
+          <a:stretch>
+            <a:fillRect/>
+          </a:stretch>
+        </p:blipFill>
+        <p:spPr>
+          <a:xfrm>
+            <a:off x="8223945" y="4135943"/>
+            <a:ext cx="3424701" cy="2413022"/>
+          </a:xfrm>
+          <a:prstGeom prst="rect">
+            <a:avLst/>
+          </a:prstGeom>
+        </p:spPr>
+      </p:pic>
+    </p:spTree>
+    <p:extLst>
+      <p:ext uri="{BB962C8B-B14F-4D97-AF65-F5344CB8AC3E}">
+        <p14:creationId xmlns:p14="http://schemas.microsoft.com/office/powerpoint/2010/main" val="454569677"/>
+      </p:ext>
+    </p:extLst>
+  </p:cSld>
+  <p:clrMapOvr>
+    <a:masterClrMapping/>
+  </p:clrMapOvr>
+</p:sld>
+</file>
+
+<file path=ppt/slides/slide31.xml><?xml version="1.0" encoding="utf-8"?>
+<p:sld xmlns:a="http://schemas.openxmlformats.org/drawingml/2006/main" xmlns:r="http://schemas.openxmlformats.org/officeDocument/2006/relationships" xmlns:p="http://schemas.openxmlformats.org/presentationml/2006/main">
+  <p:cSld>
+    <p:spTree>
+      <p:nvGrpSpPr>
+        <p:cNvPr id="1" name=""/>
+        <p:cNvGrpSpPr/>
+        <p:nvPr/>
+      </p:nvGrpSpPr>
+      <p:grpSpPr>
+        <a:xfrm>
+          <a:off x="0" y="0"/>
+          <a:ext cx="0" cy="0"/>
+          <a:chOff x="0" y="0"/>
+          <a:chExt cx="0" cy="0"/>
+        </a:xfrm>
+      </p:grpSpPr>
+      <p:sp>
+        <p:nvSpPr>
+          <p:cNvPr id="7" name="TextBox 6">
+            <a:extLst>
+              <a:ext uri="{FF2B5EF4-FFF2-40B4-BE49-F238E27FC236}">
+                <a16:creationId xmlns:a16="http://schemas.microsoft.com/office/drawing/2014/main" id="{A063DF1C-7DF0-40B4-AC9D-EC918B0CB000}"/>
+              </a:ext>
+            </a:extLst>
+          </p:cNvPr>
+          <p:cNvSpPr txBox="1"/>
+          <p:nvPr/>
+        </p:nvSpPr>
+        <p:spPr>
+          <a:xfrm>
+            <a:off x="201996" y="-369332"/>
+            <a:ext cx="3101370" cy="369332"/>
+          </a:xfrm>
+          <a:prstGeom prst="rect">
+            <a:avLst/>
+          </a:prstGeom>
+          <a:noFill/>
+        </p:spPr>
+        <p:txBody>
+          <a:bodyPr wrap="square" rtlCol="0">
+            <a:spAutoFit/>
+          </a:bodyPr>
+          <a:lstStyle/>
+          <a:p>
+            <a:pPr algn="ctr"/>
+            <a:r>
+              <a:rPr lang="en-US" b="1"/>
+              <a:t>GCAM by Class Figs</a:t>
+            </a:r>
+          </a:p>
+        </p:txBody>
+      </p:sp>
+      <p:sp>
+        <p:nvSpPr>
+          <p:cNvPr id="3" name="Rectangle 2">
+            <a:extLst>
+              <a:ext uri="{FF2B5EF4-FFF2-40B4-BE49-F238E27FC236}">
+                <a16:creationId xmlns:a16="http://schemas.microsoft.com/office/drawing/2014/main" id="{80047060-3AA7-4699-9EAE-4E3F4573EEA2}"/>
+              </a:ext>
+            </a:extLst>
+          </p:cNvPr>
+          <p:cNvSpPr/>
+          <p:nvPr/>
+        </p:nvSpPr>
+        <p:spPr>
+          <a:xfrm>
+            <a:off x="442452" y="117988"/>
+            <a:ext cx="11444747" cy="6548284"/>
+          </a:xfrm>
+          <a:prstGeom prst="rect">
+            <a:avLst/>
+          </a:prstGeom>
+          <a:noFill/>
+          <a:ln>
+            <a:solidFill>
+              <a:schemeClr val="bg1">
+                <a:lumMod val="65000"/>
+              </a:schemeClr>
+            </a:solidFill>
+          </a:ln>
+        </p:spPr>
+        <p:style>
+          <a:lnRef idx="2">
+            <a:schemeClr val="accent1">
+              <a:shade val="50000"/>
+            </a:schemeClr>
+          </a:lnRef>
+          <a:fillRef idx="1">
+            <a:schemeClr val="accent1"/>
+          </a:fillRef>
+          <a:effectRef idx="0">
+            <a:schemeClr val="accent1"/>
+          </a:effectRef>
+          <a:fontRef idx="minor">
+            <a:schemeClr val="lt1"/>
+          </a:fontRef>
+        </p:style>
+        <p:txBody>
+          <a:bodyPr rtlCol="0" anchor="ctr"/>
+          <a:lstStyle/>
+          <a:p>
+            <a:pPr algn="ctr"/>
+            <a:endParaRPr lang="en-US"/>
+          </a:p>
+        </p:txBody>
+      </p:sp>
+      <p:pic>
+        <p:nvPicPr>
+          <p:cNvPr id="4" name="Picture 3" descr="A close up of a map&#10;&#10;Description automatically generated">
+            <a:extLst>
+              <a:ext uri="{FF2B5EF4-FFF2-40B4-BE49-F238E27FC236}">
+                <a16:creationId xmlns:a16="http://schemas.microsoft.com/office/drawing/2014/main" id="{54953583-8DC0-4DC1-9C80-59364DCE9939}"/>
+              </a:ext>
+            </a:extLst>
+          </p:cNvPr>
+          <p:cNvPicPr>
+            <a:picLocks noChangeAspect="1"/>
+          </p:cNvPicPr>
+          <p:nvPr/>
+        </p:nvPicPr>
+        <p:blipFill>
+          <a:blip r:embed="rId2">
+            <a:extLst>
+              <a:ext uri="{28A0092B-C50C-407E-A947-70E740481C1C}">
+                <a14:useLocalDpi xmlns:a14="http://schemas.microsoft.com/office/drawing/2010/main" val="0"/>
+              </a:ext>
+            </a:extLst>
+          </a:blip>
+          <a:stretch>
+            <a:fillRect/>
+          </a:stretch>
+        </p:blipFill>
+        <p:spPr>
+          <a:xfrm>
+            <a:off x="592175" y="545082"/>
+            <a:ext cx="7331022" cy="3993389"/>
+          </a:xfrm>
+          <a:prstGeom prst="rect">
+            <a:avLst/>
+          </a:prstGeom>
+        </p:spPr>
+      </p:pic>
+      <p:pic>
+        <p:nvPicPr>
+          <p:cNvPr id="6" name="Picture 5" descr="A picture containing text, map&#10;&#10;Description automatically generated">
+            <a:extLst>
+              <a:ext uri="{FF2B5EF4-FFF2-40B4-BE49-F238E27FC236}">
+                <a16:creationId xmlns:a16="http://schemas.microsoft.com/office/drawing/2014/main" id="{949EBDC5-4E80-425B-84EA-DDBD3A9647A4}"/>
+              </a:ext>
+            </a:extLst>
+          </p:cNvPr>
+          <p:cNvPicPr>
+            <a:picLocks noChangeAspect="1"/>
+          </p:cNvPicPr>
+          <p:nvPr/>
+        </p:nvPicPr>
+        <p:blipFill>
+          <a:blip r:embed="rId3">
+            <a:extLst>
+              <a:ext uri="{28A0092B-C50C-407E-A947-70E740481C1C}">
+                <a14:useLocalDpi xmlns:a14="http://schemas.microsoft.com/office/drawing/2010/main" val="0"/>
+              </a:ext>
+            </a:extLst>
+          </a:blip>
+          <a:stretch>
+            <a:fillRect/>
+          </a:stretch>
+        </p:blipFill>
+        <p:spPr>
+          <a:xfrm>
+            <a:off x="4257686" y="3783081"/>
+            <a:ext cx="7525130" cy="2748571"/>
+          </a:xfrm>
+          <a:prstGeom prst="rect">
+            <a:avLst/>
+          </a:prstGeom>
+        </p:spPr>
+      </p:pic>
+      <p:sp>
+        <p:nvSpPr>
+          <p:cNvPr id="9" name="TextBox 8">
+            <a:extLst>
+              <a:ext uri="{FF2B5EF4-FFF2-40B4-BE49-F238E27FC236}">
+                <a16:creationId xmlns:a16="http://schemas.microsoft.com/office/drawing/2014/main" id="{65A82A39-C97E-4486-BF84-AD752A7FF992}"/>
+              </a:ext>
+            </a:extLst>
+          </p:cNvPr>
+          <p:cNvSpPr txBox="1"/>
+          <p:nvPr/>
+        </p:nvSpPr>
+        <p:spPr>
+          <a:xfrm>
+            <a:off x="1556139" y="175750"/>
+            <a:ext cx="4210816" cy="369332"/>
+          </a:xfrm>
+          <a:prstGeom prst="rect">
+            <a:avLst/>
+          </a:prstGeom>
+          <a:noFill/>
+        </p:spPr>
+        <p:txBody>
+          <a:bodyPr wrap="square" rtlCol="0">
+            <a:spAutoFit/>
+          </a:bodyPr>
+          <a:lstStyle/>
+          <a:p>
+            <a:pPr algn="ctr"/>
+            <a:r>
+              <a:rPr lang="en-US" b="1"/>
+              <a:t>Electricity Generation SSP5 by Class 2040</a:t>
+            </a:r>
+          </a:p>
+        </p:txBody>
+      </p:sp>
+      <p:sp>
+        <p:nvSpPr>
+          <p:cNvPr id="10" name="TextBox 9">
+            <a:extLst>
+              <a:ext uri="{FF2B5EF4-FFF2-40B4-BE49-F238E27FC236}">
+                <a16:creationId xmlns:a16="http://schemas.microsoft.com/office/drawing/2014/main" id="{52335815-A0C2-4151-96C4-FDD5E5395A04}"/>
+              </a:ext>
+            </a:extLst>
+          </p:cNvPr>
+          <p:cNvSpPr txBox="1"/>
+          <p:nvPr/>
+        </p:nvSpPr>
+        <p:spPr>
+          <a:xfrm>
+            <a:off x="5929124" y="3429000"/>
+            <a:ext cx="3976074" cy="369332"/>
+          </a:xfrm>
+          <a:prstGeom prst="rect">
+            <a:avLst/>
+          </a:prstGeom>
+          <a:noFill/>
+        </p:spPr>
+        <p:txBody>
+          <a:bodyPr wrap="square" rtlCol="0">
+            <a:spAutoFit/>
+          </a:bodyPr>
+          <a:lstStyle/>
+          <a:p>
+            <a:pPr algn="ctr"/>
+            <a:r>
+              <a:rPr lang="en-US" b="1"/>
+              <a:t>Land Allocation SSP5 by Class 2040</a:t>
+            </a:r>
+          </a:p>
+        </p:txBody>
+      </p:sp>
+    </p:spTree>
+    <p:extLst>
+      <p:ext uri="{BB962C8B-B14F-4D97-AF65-F5344CB8AC3E}">
+        <p14:creationId xmlns:p14="http://schemas.microsoft.com/office/powerpoint/2010/main" val="1298961020"/>
       </p:ext>
     </p:extLst>
   </p:cSld>
@@ -14331,6 +15560,45 @@
               <a:rPr lang="en-US" sz="2400"/>
               <a:t>Same scale across years and classes</a:t>
             </a:r>
+          </a:p>
+        </p:txBody>
+      </p:sp>
+      <p:sp>
+        <p:nvSpPr>
+          <p:cNvPr id="50" name="Rectangle 49">
+            <a:extLst>
+              <a:ext uri="{FF2B5EF4-FFF2-40B4-BE49-F238E27FC236}">
+                <a16:creationId xmlns:a16="http://schemas.microsoft.com/office/drawing/2014/main" id="{52B01F8F-C641-4B73-9227-04C3323D8223}"/>
+              </a:ext>
+            </a:extLst>
+          </p:cNvPr>
+          <p:cNvSpPr/>
+          <p:nvPr/>
+        </p:nvSpPr>
+        <p:spPr>
+          <a:xfrm>
+            <a:off x="589949" y="1343001"/>
+            <a:ext cx="1159998" cy="369332"/>
+          </a:xfrm>
+          <a:prstGeom prst="rect">
+            <a:avLst/>
+          </a:prstGeom>
+        </p:spPr>
+        <p:txBody>
+          <a:bodyPr wrap="none">
+            <a:spAutoFit/>
+          </a:bodyPr>
+          <a:lstStyle/>
+          <a:p>
+            <a:r>
+              <a:rPr lang="en-US" altLang="en-US" b="1">
+                <a:solidFill>
+                  <a:srgbClr val="29A33D"/>
+                </a:solidFill>
+              </a:rPr>
+              <a:t>(Optional)</a:t>
+            </a:r>
+            <a:endParaRPr lang="en-US"/>
           </a:p>
         </p:txBody>
       </p:sp>

</xml_diff>